<commit_message>
updated slides and README for MemeGeneration
</commit_message>
<xml_diff>
--- a/BASH/MemeGenerator/BashMemeGenerator.pptx
+++ b/BASH/MemeGenerator/BashMemeGenerator.pptx
@@ -24,16 +24,20 @@
     <p:sldId id="269" r:id="rId18"/>
     <p:sldId id="270" r:id="rId19"/>
     <p:sldId id="271" r:id="rId20"/>
+    <p:sldId id="272" r:id="rId21"/>
+    <p:sldId id="273" r:id="rId22"/>
+    <p:sldId id="274" r:id="rId23"/>
+    <p:sldId id="275" r:id="rId24"/>
   </p:sldIdLst>
   <p:sldSz cy="6858000" cx="12192000"/>
   <p:notesSz cx="6858000" cy="9144000"/>
   <p:embeddedFontLst>
     <p:embeddedFont>
       <p:font typeface="PT Sans"/>
-      <p:regular r:id="rId21"/>
-      <p:bold r:id="rId22"/>
-      <p:italic r:id="rId23"/>
-      <p:boldItalic r:id="rId24"/>
+      <p:regular r:id="rId25"/>
+      <p:bold r:id="rId26"/>
+      <p:italic r:id="rId27"/>
+      <p:boldItalic r:id="rId28"/>
     </p:embeddedFont>
   </p:embeddedFontLst>
   <p:defaultTextStyle>
@@ -1199,7 +1203,7 @@
             </a:pPr>
             <a:r>
               <a:rPr lang="en-US"/>
-              <a:t>If we're going to make it scriptable we're going to add arguments.</a:t>
+              <a:t>Now yeah, we have a working script, but it’s not scriptable. For something to be scriptable we mean that it can be extended or automated through scripting.</a:t>
             </a:r>
             <a:endParaRPr/>
           </a:p>
@@ -1214,8 +1218,7 @@
               <a:buNone/>
             </a:pPr>
             <a:r>
-              <a:rPr lang="en-US"/>
-              <a:t>For each of bg, first, second, etc. we have to check if they aren't already filled by a command line argument.</a:t>
+              <a:t/>
             </a:r>
             <a:endParaRPr/>
           </a:p>
@@ -1227,11 +1230,55 @@
               <a:spcAft>
                 <a:spcPts val="0"/>
               </a:spcAft>
+              <a:buClr>
+                <a:schemeClr val="dk1"/>
+              </a:buClr>
+              <a:buSzPts val="1100"/>
+              <a:buFont typeface="Arial"/>
+              <a:buNone/>
+            </a:pPr>
+            <a:r>
+              <a:rPr lang="en-US">
+                <a:solidFill>
+                  <a:schemeClr val="dk1"/>
+                </a:solidFill>
+              </a:rPr>
+              <a:t>User input is fine, but we’d rather just fill in the meme information as command line arguments. That way it’s all on the one line, making it easier for someone to use. In all, we are just reducing the wait time the exists between you and your meme.</a:t>
+            </a:r>
+            <a:endParaRPr/>
+          </a:p>
+          <a:p>
+            <a:pPr indent="0" lvl="0" marL="0">
+              <a:spcBef>
+                <a:spcPts val="0"/>
+              </a:spcBef>
+              <a:spcAft>
+                <a:spcPts val="0"/>
+              </a:spcAft>
+              <a:buNone/>
+            </a:pPr>
+            <a:r>
+              <a:t/>
+            </a:r>
+            <a:endParaRPr/>
+          </a:p>
+          <a:p>
+            <a:pPr indent="0" lvl="0" marL="0">
+              <a:spcBef>
+                <a:spcPts val="0"/>
+              </a:spcBef>
+              <a:spcAft>
+                <a:spcPts val="0"/>
+              </a:spcAft>
               <a:buNone/>
             </a:pPr>
             <a:r>
               <a:rPr lang="en-US"/>
-              <a:t>So we add if statements to check if they're equal to the empty string and only if they are we prompt the user.</a:t>
+              <a:t>We use functions to separate blocks of code, </a:t>
+            </a:r>
+            <a:r>
+              <a:rPr lang="en-US"/>
+              <a:t>it’ll make more sense as to why this is done in the next iteration of our program.</a:t>
             </a:r>
             <a:endParaRPr/>
           </a:p>
@@ -1443,7 +1490,7 @@
             </a:pPr>
             <a:r>
               <a:rPr lang="en-US"/>
-              <a:t>getopts is an unusual but very powerful way of parsing command line arguments</a:t>
+              <a:t>If we're going to make it scriptable we're going to add arguments.</a:t>
             </a:r>
             <a:endParaRPr/>
           </a:p>
@@ -1459,7 +1506,7 @@
             </a:pPr>
             <a:r>
               <a:rPr lang="en-US"/>
-              <a:t>a colon at the start disables the default error message - we'll be supplying our own</a:t>
+              <a:t>For each of bg, first, second, etc. we have to check if they aren't already filled by a command line argument.</a:t>
             </a:r>
             <a:endParaRPr/>
           </a:p>
@@ -1475,7 +1522,7 @@
             </a:pPr>
             <a:r>
               <a:rPr lang="en-US"/>
-              <a:t>a colon after an option means that option has a required argument</a:t>
+              <a:t>So we add if statements to check if they're equal to the empty string and only if they are we prompt the user.</a:t>
             </a:r>
             <a:endParaRPr/>
           </a:p>
@@ -1490,40 +1537,7 @@
               <a:buNone/>
             </a:pPr>
             <a:r>
-              <a:rPr lang="en-US"/>
-              <a:t>the question mark is set when an invalid option is given</a:t>
-            </a:r>
-            <a:endParaRPr/>
-          </a:p>
-          <a:p>
-            <a:pPr indent="0" lvl="0" marL="0">
-              <a:spcBef>
-                <a:spcPts val="0"/>
-              </a:spcBef>
-              <a:spcAft>
-                <a:spcPts val="0"/>
-              </a:spcAft>
-              <a:buNone/>
-            </a:pPr>
-            <a:r>
-              <a:rPr lang="en-US"/>
-              <a:t>the colon case is set when an option requires an argument but no argument is given (smiley face)</a:t>
-            </a:r>
-            <a:endParaRPr/>
-          </a:p>
-          <a:p>
-            <a:pPr indent="0" lvl="0" marL="0">
-              <a:spcBef>
-                <a:spcPts val="0"/>
-              </a:spcBef>
-              <a:spcAft>
-                <a:spcPts val="0"/>
-              </a:spcAft>
-              <a:buNone/>
-            </a:pPr>
-            <a:r>
-              <a:rPr lang="en-US"/>
-              <a:t>&gt;&amp;2 means send to standard error</a:t>
+              <a:t/>
             </a:r>
             <a:endParaRPr/>
           </a:p>
@@ -1542,7 +1556,7 @@
   <p:cSld>
     <p:spTree>
       <p:nvGrpSpPr>
-        <p:cNvPr id="147" name="Shape 147"/>
+        <p:cNvPr id="148" name="Shape 148"/>
         <p:cNvGrpSpPr/>
         <p:nvPr/>
       </p:nvGrpSpPr>
@@ -1556,7 +1570,7 @@
       </p:grpSpPr>
       <p:sp>
         <p:nvSpPr>
-          <p:cNvPr id="148" name="Shape 148"/>
+          <p:cNvPr id="149" name="Shape 149"/>
           <p:cNvSpPr/>
           <p:nvPr>
             <p:ph idx="2" type="sldImg"/>
@@ -1590,7 +1604,7 @@
       </p:sp>
       <p:sp>
         <p:nvSpPr>
-          <p:cNvPr id="149" name="Shape 149"/>
+          <p:cNvPr id="150" name="Shape 150"/>
           <p:cNvSpPr txBox="1"/>
           <p:nvPr>
             <p:ph idx="1" type="body"/>
@@ -1621,102 +1635,7 @@
               <a:buNone/>
             </a:pPr>
             <a:r>
-              <a:rPr lang="en-US"/>
-              <a:t>So now it’s working with more functionality. Now we need to provide a section telling the user how to use the script. any good bash script has a help section, and this is a somewhat good bash script. </a:t>
-            </a:r>
-            <a:endParaRPr/>
-          </a:p>
-          <a:p>
-            <a:pPr indent="0" lvl="0" marL="0">
-              <a:spcBef>
-                <a:spcPts val="0"/>
-              </a:spcBef>
-              <a:spcAft>
-                <a:spcPts val="0"/>
-              </a:spcAft>
-              <a:buNone/>
-            </a:pPr>
-            <a:r>
               <a:t/>
-            </a:r>
-            <a:endParaRPr/>
-          </a:p>
-          <a:p>
-            <a:pPr indent="0" lvl="0" marL="0">
-              <a:spcBef>
-                <a:spcPts val="0"/>
-              </a:spcBef>
-              <a:spcAft>
-                <a:spcPts val="0"/>
-              </a:spcAft>
-              <a:buNone/>
-            </a:pPr>
-            <a:r>
-              <a:rPr lang="en-US"/>
-              <a:t>First off we are going to add a new option, -h which calls a new function we are going to write.</a:t>
-            </a:r>
-            <a:endParaRPr/>
-          </a:p>
-          <a:p>
-            <a:pPr indent="0" lvl="0" marL="0">
-              <a:spcBef>
-                <a:spcPts val="0"/>
-              </a:spcBef>
-              <a:spcAft>
-                <a:spcPts val="0"/>
-              </a:spcAft>
-              <a:buNone/>
-            </a:pPr>
-            <a:r>
-              <a:rPr lang="en-US"/>
-              <a:t>This new </a:t>
-            </a:r>
-            <a:r>
-              <a:rPr lang="en-US"/>
-              <a:t>function</a:t>
-            </a:r>
-            <a:r>
-              <a:rPr lang="en-US"/>
-              <a:t> is going to be called “usage”.</a:t>
-            </a:r>
-            <a:endParaRPr/>
-          </a:p>
-          <a:p>
-            <a:pPr indent="0" lvl="0" marL="0">
-              <a:spcBef>
-                <a:spcPts val="0"/>
-              </a:spcBef>
-              <a:spcAft>
-                <a:spcPts val="0"/>
-              </a:spcAft>
-              <a:buNone/>
-            </a:pPr>
-            <a:r>
-              <a:t/>
-            </a:r>
-            <a:endParaRPr/>
-          </a:p>
-          <a:p>
-            <a:pPr indent="0" lvl="0" marL="0">
-              <a:spcBef>
-                <a:spcPts val="0"/>
-              </a:spcBef>
-              <a:spcAft>
-                <a:spcPts val="0"/>
-              </a:spcAft>
-              <a:buNone/>
-            </a:pPr>
-            <a:r>
-              <a:rPr lang="en-US"/>
-              <a:t>The CAT - EOF syntax is very useful for writing out these help sections. </a:t>
-            </a:r>
-            <a:r>
-              <a:rPr lang="en-US">
-                <a:solidFill>
-                  <a:schemeClr val="dk1"/>
-                </a:solidFill>
-              </a:rPr>
-              <a:t>This syntax is going to introduce you to a handy way of working with multi-line text in BASH. </a:t>
             </a:r>
             <a:endParaRPr/>
           </a:p>
@@ -1814,7 +1733,88 @@
               <a:buNone/>
             </a:pPr>
             <a:r>
-              <a:t/>
+              <a:rPr lang="en-US"/>
+              <a:t>getopts is an unusual but very powerful way of parsing command line arguments</a:t>
+            </a:r>
+            <a:endParaRPr/>
+          </a:p>
+          <a:p>
+            <a:pPr indent="0" lvl="0" marL="0">
+              <a:spcBef>
+                <a:spcPts val="0"/>
+              </a:spcBef>
+              <a:spcAft>
+                <a:spcPts val="0"/>
+              </a:spcAft>
+              <a:buNone/>
+            </a:pPr>
+            <a:r>
+              <a:rPr lang="en-US"/>
+              <a:t>a colon at the start disables the default error message - we'll be supplying our own</a:t>
+            </a:r>
+            <a:endParaRPr/>
+          </a:p>
+          <a:p>
+            <a:pPr indent="0" lvl="0" marL="0">
+              <a:spcBef>
+                <a:spcPts val="0"/>
+              </a:spcBef>
+              <a:spcAft>
+                <a:spcPts val="0"/>
+              </a:spcAft>
+              <a:buNone/>
+            </a:pPr>
+            <a:r>
+              <a:rPr lang="en-US"/>
+              <a:t>a colon after an option means that option has a required argument</a:t>
+            </a:r>
+            <a:endParaRPr/>
+          </a:p>
+          <a:p>
+            <a:pPr indent="0" lvl="0" marL="0">
+              <a:spcBef>
+                <a:spcPts val="0"/>
+              </a:spcBef>
+              <a:spcAft>
+                <a:spcPts val="0"/>
+              </a:spcAft>
+              <a:buNone/>
+            </a:pPr>
+            <a:r>
+              <a:rPr lang="en-US"/>
+              <a:t>the question mark is set when an invalid option is given</a:t>
+            </a:r>
+            <a:endParaRPr/>
+          </a:p>
+          <a:p>
+            <a:pPr indent="0" lvl="0" marL="0">
+              <a:spcBef>
+                <a:spcPts val="0"/>
+              </a:spcBef>
+              <a:spcAft>
+                <a:spcPts val="0"/>
+              </a:spcAft>
+              <a:buNone/>
+            </a:pPr>
+            <a:r>
+              <a:rPr lang="en-US"/>
+              <a:t>the colon case is set when an option requires an argument but no argument is given (smiley face)</a:t>
+            </a:r>
+            <a:endParaRPr/>
+          </a:p>
+          <a:p>
+            <a:pPr indent="0" lvl="0" marL="0">
+              <a:spcBef>
+                <a:spcPts val="0"/>
+              </a:spcBef>
+              <a:spcAft>
+                <a:spcPts val="0"/>
+              </a:spcAft>
+              <a:buNone/>
+            </a:pPr>
+            <a:r>
+              <a:rPr lang="en-US"/>
+              <a:t>&gt;&amp;2 means send to standard error</a:t>
             </a:r>
             <a:endParaRPr/>
           </a:p>
@@ -1912,9 +1912,204 @@
               <a:buNone/>
             </a:pPr>
             <a:r>
+              <a:rPr lang="en-US"/>
+              <a:t>So now it’s working with more functionality. Now we need to provide a section telling the user how to use the script. any good bash script has a help section, and this is a somewhat good bash script. </a:t>
+            </a:r>
+            <a:endParaRPr/>
+          </a:p>
+          <a:p>
+            <a:pPr indent="0" lvl="0" marL="0">
+              <a:spcBef>
+                <a:spcPts val="0"/>
+              </a:spcBef>
+              <a:spcAft>
+                <a:spcPts val="0"/>
+              </a:spcAft>
+              <a:buNone/>
+            </a:pPr>
+            <a:r>
               <a:t/>
             </a:r>
             <a:endParaRPr/>
+          </a:p>
+          <a:p>
+            <a:pPr indent="0" lvl="0" marL="0">
+              <a:spcBef>
+                <a:spcPts val="0"/>
+              </a:spcBef>
+              <a:spcAft>
+                <a:spcPts val="0"/>
+              </a:spcAft>
+              <a:buNone/>
+            </a:pPr>
+            <a:r>
+              <a:rPr lang="en-US"/>
+              <a:t>First off we are going to add a new option, -h which calls a new function we are going to write.</a:t>
+            </a:r>
+            <a:endParaRPr/>
+          </a:p>
+          <a:p>
+            <a:pPr indent="0" lvl="0" marL="0">
+              <a:spcBef>
+                <a:spcPts val="0"/>
+              </a:spcBef>
+              <a:spcAft>
+                <a:spcPts val="0"/>
+              </a:spcAft>
+              <a:buNone/>
+            </a:pPr>
+            <a:r>
+              <a:rPr lang="en-US"/>
+              <a:t>This new </a:t>
+            </a:r>
+            <a:r>
+              <a:rPr lang="en-US"/>
+              <a:t>function</a:t>
+            </a:r>
+            <a:r>
+              <a:rPr lang="en-US"/>
+              <a:t> is going to be called “usage”.</a:t>
+            </a:r>
+            <a:endParaRPr/>
+          </a:p>
+          <a:p>
+            <a:pPr indent="0" lvl="0" marL="0">
+              <a:spcBef>
+                <a:spcPts val="0"/>
+              </a:spcBef>
+              <a:spcAft>
+                <a:spcPts val="0"/>
+              </a:spcAft>
+              <a:buNone/>
+            </a:pPr>
+            <a:r>
+              <a:t/>
+            </a:r>
+            <a:endParaRPr/>
+          </a:p>
+          <a:p>
+            <a:pPr indent="0" lvl="0" marL="0">
+              <a:spcBef>
+                <a:spcPts val="0"/>
+              </a:spcBef>
+              <a:spcAft>
+                <a:spcPts val="0"/>
+              </a:spcAft>
+              <a:buNone/>
+            </a:pPr>
+            <a:r>
+              <a:rPr lang="en-US"/>
+              <a:t>The CAT - EOF syntax is very useful for writing out these help sections. </a:t>
+            </a:r>
+            <a:r>
+              <a:rPr lang="en-US">
+                <a:solidFill>
+                  <a:schemeClr val="dk1"/>
+                </a:solidFill>
+              </a:rPr>
+              <a:t>This syntax is going to introduce you to a handy way of working with multi-line text in BASH. </a:t>
+            </a:r>
+            <a:endParaRPr>
+              <a:solidFill>
+                <a:schemeClr val="dk1"/>
+              </a:solidFill>
+            </a:endParaRPr>
+          </a:p>
+          <a:p>
+            <a:pPr indent="0" lvl="0" marL="0">
+              <a:spcBef>
+                <a:spcPts val="0"/>
+              </a:spcBef>
+              <a:spcAft>
+                <a:spcPts val="0"/>
+              </a:spcAft>
+              <a:buNone/>
+            </a:pPr>
+            <a:r>
+              <a:t/>
+            </a:r>
+            <a:endParaRPr>
+              <a:solidFill>
+                <a:schemeClr val="dk1"/>
+              </a:solidFill>
+            </a:endParaRPr>
+          </a:p>
+          <a:p>
+            <a:pPr indent="0" lvl="0" marL="0">
+              <a:spcBef>
+                <a:spcPts val="0"/>
+              </a:spcBef>
+              <a:spcAft>
+                <a:spcPts val="0"/>
+              </a:spcAft>
+              <a:buClr>
+                <a:schemeClr val="dk1"/>
+              </a:buClr>
+              <a:buSzPts val="1100"/>
+              <a:buFont typeface="Arial"/>
+              <a:buNone/>
+            </a:pPr>
+            <a:r>
+              <a:rPr lang="en-US">
+                <a:solidFill>
+                  <a:schemeClr val="dk1"/>
+                </a:solidFill>
+              </a:rPr>
+              <a:t>We are swapping out curl for wget. wget, for now, you can see as just another way of retrieving content from web servers. </a:t>
+            </a:r>
+            <a:endParaRPr>
+              <a:solidFill>
+                <a:schemeClr val="dk1"/>
+              </a:solidFill>
+            </a:endParaRPr>
+          </a:p>
+          <a:p>
+            <a:pPr indent="0" lvl="0" marL="0">
+              <a:spcBef>
+                <a:spcPts val="0"/>
+              </a:spcBef>
+              <a:spcAft>
+                <a:spcPts val="0"/>
+              </a:spcAft>
+              <a:buClr>
+                <a:schemeClr val="dk1"/>
+              </a:buClr>
+              <a:buSzPts val="1100"/>
+              <a:buFont typeface="Arial"/>
+              <a:buNone/>
+            </a:pPr>
+            <a:r>
+              <a:rPr lang="en-US">
+                <a:solidFill>
+                  <a:schemeClr val="dk1"/>
+                </a:solidFill>
+              </a:rPr>
+              <a:t>We are swapping from curl to wget for two reasons, curl doesn't escape spaces, while wget does.</a:t>
+            </a:r>
+            <a:endParaRPr>
+              <a:solidFill>
+                <a:schemeClr val="dk1"/>
+              </a:solidFill>
+            </a:endParaRPr>
+          </a:p>
+          <a:p>
+            <a:pPr indent="0" lvl="0" marL="0">
+              <a:spcBef>
+                <a:spcPts val="0"/>
+              </a:spcBef>
+              <a:spcAft>
+                <a:spcPts val="0"/>
+              </a:spcAft>
+              <a:buNone/>
+            </a:pPr>
+            <a:r>
+              <a:t/>
+            </a:r>
+            <a:endParaRPr>
+              <a:solidFill>
+                <a:schemeClr val="dk1"/>
+              </a:solidFill>
+            </a:endParaRPr>
           </a:p>
         </p:txBody>
       </p:sp>
@@ -1931,7 +2126,7 @@
   <p:cSld>
     <p:spTree>
       <p:nvGrpSpPr>
-        <p:cNvPr id="163" name="Shape 163"/>
+        <p:cNvPr id="164" name="Shape 164"/>
         <p:cNvGrpSpPr/>
         <p:nvPr/>
       </p:nvGrpSpPr>
@@ -1945,7 +2140,7 @@
       </p:grpSpPr>
       <p:sp>
         <p:nvSpPr>
-          <p:cNvPr id="164" name="Shape 164"/>
+          <p:cNvPr id="165" name="Shape 165"/>
           <p:cNvSpPr/>
           <p:nvPr>
             <p:ph idx="2" type="sldImg"/>
@@ -1979,7 +2174,301 @@
       </p:sp>
       <p:sp>
         <p:nvSpPr>
-          <p:cNvPr id="165" name="Shape 165"/>
+          <p:cNvPr id="166" name="Shape 166"/>
+          <p:cNvSpPr txBox="1"/>
+          <p:nvPr>
+            <p:ph idx="1" type="body"/>
+          </p:nvPr>
+        </p:nvSpPr>
+        <p:spPr>
+          <a:xfrm>
+            <a:off x="685800" y="4343400"/>
+            <a:ext cx="5486400" cy="4114800"/>
+          </a:xfrm>
+          <a:prstGeom prst="rect">
+            <a:avLst/>
+          </a:prstGeom>
+        </p:spPr>
+        <p:txBody>
+          <a:bodyPr anchorCtr="0" anchor="t" bIns="91425" lIns="91425" spcFirstLastPara="1" rIns="91425" wrap="square" tIns="91425">
+            <a:noAutofit/>
+          </a:bodyPr>
+          <a:lstStyle/>
+          <a:p>
+            <a:pPr indent="0" lvl="0" marL="0">
+              <a:spcBef>
+                <a:spcPts val="0"/>
+              </a:spcBef>
+              <a:spcAft>
+                <a:spcPts val="0"/>
+              </a:spcAft>
+              <a:buNone/>
+            </a:pPr>
+            <a:r>
+              <a:t/>
+            </a:r>
+            <a:endParaRPr/>
+          </a:p>
+        </p:txBody>
+      </p:sp>
+    </p:spTree>
+  </p:cSld>
+  <p:clrMapOvr>
+    <a:masterClrMapping/>
+  </p:clrMapOvr>
+</p:notes>
+</file>
+
+<file path=ppt/notesSlides/notesSlide17.xml><?xml version="1.0" encoding="utf-8"?>
+<p:notes xmlns:a="http://schemas.openxmlformats.org/drawingml/2006/main" xmlns:r="http://schemas.openxmlformats.org/officeDocument/2006/relationships" xmlns:mc="http://schemas.openxmlformats.org/markup-compatibility/2006" xmlns:mv="urn:schemas-microsoft-com:mac:vml" xmlns:p="http://schemas.openxmlformats.org/presentationml/2006/main" xmlns:c="http://schemas.openxmlformats.org/drawingml/2006/chart" xmlns:dgm="http://schemas.openxmlformats.org/drawingml/2006/diagram" xmlns:o="urn:schemas-microsoft-com:office:office" xmlns:v="urn:schemas-microsoft-com:vml" xmlns:pvml="urn:schemas-microsoft-com:office:powerpoint" xmlns:com="http://schemas.openxmlformats.org/drawingml/2006/compatibility" xmlns:p14="http://schemas.microsoft.com/office/powerpoint/2010/main" xmlns:p15="http://schemas.microsoft.com/office/powerpoint/2012/main" showMasterPhAnim="0" showMasterSp="0">
+  <p:cSld>
+    <p:spTree>
+      <p:nvGrpSpPr>
+        <p:cNvPr id="169" name="Shape 169"/>
+        <p:cNvGrpSpPr/>
+        <p:nvPr/>
+      </p:nvGrpSpPr>
+      <p:grpSpPr>
+        <a:xfrm>
+          <a:off x="0" y="0"/>
+          <a:ext cx="0" cy="0"/>
+          <a:chOff x="0" y="0"/>
+          <a:chExt cx="0" cy="0"/>
+        </a:xfrm>
+      </p:grpSpPr>
+      <p:sp>
+        <p:nvSpPr>
+          <p:cNvPr id="170" name="Shape 170"/>
+          <p:cNvSpPr/>
+          <p:nvPr>
+            <p:ph idx="2" type="sldImg"/>
+          </p:nvPr>
+        </p:nvSpPr>
+        <p:spPr>
+          <a:xfrm>
+            <a:off x="1143225" y="685800"/>
+            <a:ext cx="4572300" cy="3429000"/>
+          </a:xfrm>
+          <a:custGeom>
+            <a:pathLst>
+              <a:path extrusionOk="0" h="120000" w="120000">
+                <a:moveTo>
+                  <a:pt x="0" y="0"/>
+                </a:moveTo>
+                <a:lnTo>
+                  <a:pt x="120000" y="0"/>
+                </a:lnTo>
+                <a:lnTo>
+                  <a:pt x="120000" y="120000"/>
+                </a:lnTo>
+                <a:lnTo>
+                  <a:pt x="0" y="120000"/>
+                </a:lnTo>
+                <a:close/>
+              </a:path>
+            </a:pathLst>
+          </a:custGeom>
+        </p:spPr>
+      </p:sp>
+      <p:sp>
+        <p:nvSpPr>
+          <p:cNvPr id="171" name="Shape 171"/>
+          <p:cNvSpPr txBox="1"/>
+          <p:nvPr>
+            <p:ph idx="1" type="body"/>
+          </p:nvPr>
+        </p:nvSpPr>
+        <p:spPr>
+          <a:xfrm>
+            <a:off x="685800" y="4343400"/>
+            <a:ext cx="5486400" cy="4114800"/>
+          </a:xfrm>
+          <a:prstGeom prst="rect">
+            <a:avLst/>
+          </a:prstGeom>
+        </p:spPr>
+        <p:txBody>
+          <a:bodyPr anchorCtr="0" anchor="t" bIns="91425" lIns="91425" spcFirstLastPara="1" rIns="91425" wrap="square" tIns="91425">
+            <a:noAutofit/>
+          </a:bodyPr>
+          <a:lstStyle/>
+          <a:p>
+            <a:pPr indent="0" lvl="0" marL="0">
+              <a:spcBef>
+                <a:spcPts val="0"/>
+              </a:spcBef>
+              <a:spcAft>
+                <a:spcPts val="0"/>
+              </a:spcAft>
+              <a:buNone/>
+            </a:pPr>
+            <a:r>
+              <a:t/>
+            </a:r>
+            <a:endParaRPr/>
+          </a:p>
+        </p:txBody>
+      </p:sp>
+    </p:spTree>
+  </p:cSld>
+  <p:clrMapOvr>
+    <a:masterClrMapping/>
+  </p:clrMapOvr>
+</p:notes>
+</file>
+
+<file path=ppt/notesSlides/notesSlide18.xml><?xml version="1.0" encoding="utf-8"?>
+<p:notes xmlns:a="http://schemas.openxmlformats.org/drawingml/2006/main" xmlns:r="http://schemas.openxmlformats.org/officeDocument/2006/relationships" xmlns:mc="http://schemas.openxmlformats.org/markup-compatibility/2006" xmlns:mv="urn:schemas-microsoft-com:mac:vml" xmlns:p="http://schemas.openxmlformats.org/presentationml/2006/main" xmlns:c="http://schemas.openxmlformats.org/drawingml/2006/chart" xmlns:dgm="http://schemas.openxmlformats.org/drawingml/2006/diagram" xmlns:o="urn:schemas-microsoft-com:office:office" xmlns:v="urn:schemas-microsoft-com:vml" xmlns:pvml="urn:schemas-microsoft-com:office:powerpoint" xmlns:com="http://schemas.openxmlformats.org/drawingml/2006/compatibility" xmlns:p14="http://schemas.microsoft.com/office/powerpoint/2010/main" xmlns:p15="http://schemas.microsoft.com/office/powerpoint/2012/main" showMasterPhAnim="0" showMasterSp="0">
+  <p:cSld>
+    <p:spTree>
+      <p:nvGrpSpPr>
+        <p:cNvPr id="174" name="Shape 174"/>
+        <p:cNvGrpSpPr/>
+        <p:nvPr/>
+      </p:nvGrpSpPr>
+      <p:grpSpPr>
+        <a:xfrm>
+          <a:off x="0" y="0"/>
+          <a:ext cx="0" cy="0"/>
+          <a:chOff x="0" y="0"/>
+          <a:chExt cx="0" cy="0"/>
+        </a:xfrm>
+      </p:grpSpPr>
+      <p:sp>
+        <p:nvSpPr>
+          <p:cNvPr id="175" name="Shape 175"/>
+          <p:cNvSpPr/>
+          <p:nvPr>
+            <p:ph idx="2" type="sldImg"/>
+          </p:nvPr>
+        </p:nvSpPr>
+        <p:spPr>
+          <a:xfrm>
+            <a:off x="1143225" y="685800"/>
+            <a:ext cx="4572300" cy="3429000"/>
+          </a:xfrm>
+          <a:custGeom>
+            <a:pathLst>
+              <a:path extrusionOk="0" h="120000" w="120000">
+                <a:moveTo>
+                  <a:pt x="0" y="0"/>
+                </a:moveTo>
+                <a:lnTo>
+                  <a:pt x="120000" y="0"/>
+                </a:lnTo>
+                <a:lnTo>
+                  <a:pt x="120000" y="120000"/>
+                </a:lnTo>
+                <a:lnTo>
+                  <a:pt x="0" y="120000"/>
+                </a:lnTo>
+                <a:close/>
+              </a:path>
+            </a:pathLst>
+          </a:custGeom>
+        </p:spPr>
+      </p:sp>
+      <p:sp>
+        <p:nvSpPr>
+          <p:cNvPr id="176" name="Shape 176"/>
+          <p:cNvSpPr txBox="1"/>
+          <p:nvPr>
+            <p:ph idx="1" type="body"/>
+          </p:nvPr>
+        </p:nvSpPr>
+        <p:spPr>
+          <a:xfrm>
+            <a:off x="685800" y="4343400"/>
+            <a:ext cx="5486400" cy="4114800"/>
+          </a:xfrm>
+          <a:prstGeom prst="rect">
+            <a:avLst/>
+          </a:prstGeom>
+        </p:spPr>
+        <p:txBody>
+          <a:bodyPr anchorCtr="0" anchor="t" bIns="91425" lIns="91425" spcFirstLastPara="1" rIns="91425" wrap="square" tIns="91425">
+            <a:noAutofit/>
+          </a:bodyPr>
+          <a:lstStyle/>
+          <a:p>
+            <a:pPr indent="0" lvl="0" marL="0">
+              <a:spcBef>
+                <a:spcPts val="0"/>
+              </a:spcBef>
+              <a:spcAft>
+                <a:spcPts val="0"/>
+              </a:spcAft>
+              <a:buNone/>
+            </a:pPr>
+            <a:r>
+              <a:t/>
+            </a:r>
+            <a:endParaRPr/>
+          </a:p>
+        </p:txBody>
+      </p:sp>
+    </p:spTree>
+  </p:cSld>
+  <p:clrMapOvr>
+    <a:masterClrMapping/>
+  </p:clrMapOvr>
+</p:notes>
+</file>
+
+<file path=ppt/notesSlides/notesSlide19.xml><?xml version="1.0" encoding="utf-8"?>
+<p:notes xmlns:a="http://schemas.openxmlformats.org/drawingml/2006/main" xmlns:r="http://schemas.openxmlformats.org/officeDocument/2006/relationships" xmlns:mc="http://schemas.openxmlformats.org/markup-compatibility/2006" xmlns:mv="urn:schemas-microsoft-com:mac:vml" xmlns:p="http://schemas.openxmlformats.org/presentationml/2006/main" xmlns:c="http://schemas.openxmlformats.org/drawingml/2006/chart" xmlns:dgm="http://schemas.openxmlformats.org/drawingml/2006/diagram" xmlns:o="urn:schemas-microsoft-com:office:office" xmlns:v="urn:schemas-microsoft-com:vml" xmlns:pvml="urn:schemas-microsoft-com:office:powerpoint" xmlns:com="http://schemas.openxmlformats.org/drawingml/2006/compatibility" xmlns:p14="http://schemas.microsoft.com/office/powerpoint/2010/main" xmlns:p15="http://schemas.microsoft.com/office/powerpoint/2012/main" showMasterPhAnim="0" showMasterSp="0">
+  <p:cSld>
+    <p:spTree>
+      <p:nvGrpSpPr>
+        <p:cNvPr id="179" name="Shape 179"/>
+        <p:cNvGrpSpPr/>
+        <p:nvPr/>
+      </p:nvGrpSpPr>
+      <p:grpSpPr>
+        <a:xfrm>
+          <a:off x="0" y="0"/>
+          <a:ext cx="0" cy="0"/>
+          <a:chOff x="0" y="0"/>
+          <a:chExt cx="0" cy="0"/>
+        </a:xfrm>
+      </p:grpSpPr>
+      <p:sp>
+        <p:nvSpPr>
+          <p:cNvPr id="180" name="Shape 180"/>
+          <p:cNvSpPr/>
+          <p:nvPr>
+            <p:ph idx="2" type="sldImg"/>
+          </p:nvPr>
+        </p:nvSpPr>
+        <p:spPr>
+          <a:xfrm>
+            <a:off x="1143225" y="685800"/>
+            <a:ext cx="4572300" cy="3429000"/>
+          </a:xfrm>
+          <a:custGeom>
+            <a:pathLst>
+              <a:path extrusionOk="0" h="120000" w="120000">
+                <a:moveTo>
+                  <a:pt x="0" y="0"/>
+                </a:moveTo>
+                <a:lnTo>
+                  <a:pt x="120000" y="0"/>
+                </a:lnTo>
+                <a:lnTo>
+                  <a:pt x="120000" y="120000"/>
+                </a:lnTo>
+                <a:lnTo>
+                  <a:pt x="0" y="120000"/>
+                </a:lnTo>
+                <a:close/>
+              </a:path>
+            </a:pathLst>
+          </a:custGeom>
+        </p:spPr>
+      </p:sp>
+      <p:sp>
+        <p:nvSpPr>
+          <p:cNvPr id="181" name="Shape 181"/>
           <p:cNvSpPr txBox="1"/>
           <p:nvPr>
             <p:ph idx="1" type="body"/>
@@ -2241,6 +2730,104 @@
 </p:notes>
 </file>
 
+<file path=ppt/notesSlides/notesSlide20.xml><?xml version="1.0" encoding="utf-8"?>
+<p:notes xmlns:a="http://schemas.openxmlformats.org/drawingml/2006/main" xmlns:r="http://schemas.openxmlformats.org/officeDocument/2006/relationships" xmlns:mc="http://schemas.openxmlformats.org/markup-compatibility/2006" xmlns:mv="urn:schemas-microsoft-com:mac:vml" xmlns:p="http://schemas.openxmlformats.org/presentationml/2006/main" xmlns:c="http://schemas.openxmlformats.org/drawingml/2006/chart" xmlns:dgm="http://schemas.openxmlformats.org/drawingml/2006/diagram" xmlns:o="urn:schemas-microsoft-com:office:office" xmlns:v="urn:schemas-microsoft-com:vml" xmlns:pvml="urn:schemas-microsoft-com:office:powerpoint" xmlns:com="http://schemas.openxmlformats.org/drawingml/2006/compatibility" xmlns:p14="http://schemas.microsoft.com/office/powerpoint/2010/main" xmlns:p15="http://schemas.microsoft.com/office/powerpoint/2012/main" showMasterPhAnim="0" showMasterSp="0">
+  <p:cSld>
+    <p:spTree>
+      <p:nvGrpSpPr>
+        <p:cNvPr id="184" name="Shape 184"/>
+        <p:cNvGrpSpPr/>
+        <p:nvPr/>
+      </p:nvGrpSpPr>
+      <p:grpSpPr>
+        <a:xfrm>
+          <a:off x="0" y="0"/>
+          <a:ext cx="0" cy="0"/>
+          <a:chOff x="0" y="0"/>
+          <a:chExt cx="0" cy="0"/>
+        </a:xfrm>
+      </p:grpSpPr>
+      <p:sp>
+        <p:nvSpPr>
+          <p:cNvPr id="185" name="Shape 185"/>
+          <p:cNvSpPr/>
+          <p:nvPr>
+            <p:ph idx="2" type="sldImg"/>
+          </p:nvPr>
+        </p:nvSpPr>
+        <p:spPr>
+          <a:xfrm>
+            <a:off x="1143225" y="685800"/>
+            <a:ext cx="4572300" cy="3429000"/>
+          </a:xfrm>
+          <a:custGeom>
+            <a:pathLst>
+              <a:path extrusionOk="0" h="120000" w="120000">
+                <a:moveTo>
+                  <a:pt x="0" y="0"/>
+                </a:moveTo>
+                <a:lnTo>
+                  <a:pt x="120000" y="0"/>
+                </a:lnTo>
+                <a:lnTo>
+                  <a:pt x="120000" y="120000"/>
+                </a:lnTo>
+                <a:lnTo>
+                  <a:pt x="0" y="120000"/>
+                </a:lnTo>
+                <a:close/>
+              </a:path>
+            </a:pathLst>
+          </a:custGeom>
+        </p:spPr>
+      </p:sp>
+      <p:sp>
+        <p:nvSpPr>
+          <p:cNvPr id="186" name="Shape 186"/>
+          <p:cNvSpPr txBox="1"/>
+          <p:nvPr>
+            <p:ph idx="1" type="body"/>
+          </p:nvPr>
+        </p:nvSpPr>
+        <p:spPr>
+          <a:xfrm>
+            <a:off x="685800" y="4343400"/>
+            <a:ext cx="5486400" cy="4114800"/>
+          </a:xfrm>
+          <a:prstGeom prst="rect">
+            <a:avLst/>
+          </a:prstGeom>
+        </p:spPr>
+        <p:txBody>
+          <a:bodyPr anchorCtr="0" anchor="t" bIns="91425" lIns="91425" spcFirstLastPara="1" rIns="91425" wrap="square" tIns="91425">
+            <a:noAutofit/>
+          </a:bodyPr>
+          <a:lstStyle/>
+          <a:p>
+            <a:pPr indent="0" lvl="0" marL="0">
+              <a:spcBef>
+                <a:spcPts val="0"/>
+              </a:spcBef>
+              <a:spcAft>
+                <a:spcPts val="0"/>
+              </a:spcAft>
+              <a:buNone/>
+            </a:pPr>
+            <a:r>
+              <a:t/>
+            </a:r>
+            <a:endParaRPr/>
+          </a:p>
+        </p:txBody>
+      </p:sp>
+    </p:spTree>
+  </p:cSld>
+  <p:clrMapOvr>
+    <a:masterClrMapping/>
+  </p:clrMapOvr>
+</p:notes>
+</file>
+
 <file path=ppt/notesSlides/notesSlide3.xml><?xml version="1.0" encoding="utf-8"?>
 <p:notes xmlns:a="http://schemas.openxmlformats.org/drawingml/2006/main" xmlns:r="http://schemas.openxmlformats.org/officeDocument/2006/relationships" xmlns:mc="http://schemas.openxmlformats.org/markup-compatibility/2006" xmlns:mv="urn:schemas-microsoft-com:mac:vml" xmlns:p="http://schemas.openxmlformats.org/presentationml/2006/main" xmlns:c="http://schemas.openxmlformats.org/drawingml/2006/chart" xmlns:dgm="http://schemas.openxmlformats.org/drawingml/2006/diagram" xmlns:o="urn:schemas-microsoft-com:office:office" xmlns:v="urn:schemas-microsoft-com:vml" xmlns:pvml="urn:schemas-microsoft-com:office:powerpoint" xmlns:com="http://schemas.openxmlformats.org/drawingml/2006/compatibility" xmlns:p14="http://schemas.microsoft.com/office/powerpoint/2010/main" xmlns:p15="http://schemas.microsoft.com/office/powerpoint/2012/main" showMasterPhAnim="0" showMasterSp="0">
   <p:cSld>
@@ -2453,200 +3040,6 @@
               <a:spcAft>
                 <a:spcPts val="0"/>
               </a:spcAft>
-              <a:buClr>
-                <a:schemeClr val="dk1"/>
-              </a:buClr>
-              <a:buSzPts val="1100"/>
-              <a:buFont typeface="Arial"/>
-              <a:buNone/>
-            </a:pPr>
-            <a:r>
-              <a:rPr lang="en-US">
-                <a:solidFill>
-                  <a:schemeClr val="dk1"/>
-                </a:solidFill>
-              </a:rPr>
-              <a:t>We are going to be dividing this talk into 5 different sections or iterations. If I was you, I’d have a file per iteration, you see every iteration is going to work, they’re all just going to be a little better than the previous version in terms of usability and functionality.</a:t>
-            </a:r>
-            <a:endParaRPr>
-              <a:solidFill>
-                <a:schemeClr val="dk1"/>
-              </a:solidFill>
-            </a:endParaRPr>
-          </a:p>
-          <a:p>
-            <a:pPr indent="0" lvl="0" marL="0">
-              <a:spcBef>
-                <a:spcPts val="0"/>
-              </a:spcBef>
-              <a:spcAft>
-                <a:spcPts val="0"/>
-              </a:spcAft>
-              <a:buNone/>
-            </a:pPr>
-            <a:r>
-              <a:t/>
-            </a:r>
-            <a:endParaRPr/>
-          </a:p>
-          <a:p>
-            <a:pPr indent="0" lvl="0" marL="0">
-              <a:spcBef>
-                <a:spcPts val="0"/>
-              </a:spcBef>
-              <a:spcAft>
-                <a:spcPts val="0"/>
-              </a:spcAft>
-              <a:buNone/>
-            </a:pPr>
-            <a:r>
-              <a:rPr lang="en-US"/>
-              <a:t>So let’s get started, I want everyone here to power on there machines and fire up a terminal.</a:t>
-            </a:r>
-            <a:endParaRPr/>
-          </a:p>
-          <a:p>
-            <a:pPr indent="0" lvl="0" marL="0">
-              <a:spcBef>
-                <a:spcPts val="0"/>
-              </a:spcBef>
-              <a:spcAft>
-                <a:spcPts val="0"/>
-              </a:spcAft>
-              <a:buNone/>
-            </a:pPr>
-            <a:r>
-              <a:t/>
-            </a:r>
-            <a:endParaRPr/>
-          </a:p>
-          <a:p>
-            <a:pPr indent="0" lvl="0" marL="0">
-              <a:spcBef>
-                <a:spcPts val="0"/>
-              </a:spcBef>
-              <a:spcAft>
-                <a:spcPts val="0"/>
-              </a:spcAft>
-              <a:buNone/>
-            </a:pPr>
-            <a:r>
-              <a:rPr lang="en-US"/>
-              <a:t>We all ready?</a:t>
-            </a:r>
-            <a:endParaRPr/>
-          </a:p>
-          <a:p>
-            <a:pPr indent="0" lvl="0" marL="0">
-              <a:spcBef>
-                <a:spcPts val="0"/>
-              </a:spcBef>
-              <a:spcAft>
-                <a:spcPts val="0"/>
-              </a:spcAft>
-              <a:buNone/>
-            </a:pPr>
-            <a:r>
-              <a:rPr lang="en-US"/>
-              <a:t>Okay so real quick, in this first iteration we will be going over a few things in particular. Firstly you’ll be seeing how to take user input with BASH, and furthermore you’ll see how variables work.</a:t>
-            </a:r>
-            <a:endParaRPr/>
-          </a:p>
-          <a:p>
-            <a:pPr indent="0" lvl="0" marL="0">
-              <a:spcBef>
-                <a:spcPts val="0"/>
-              </a:spcBef>
-              <a:spcAft>
-                <a:spcPts val="0"/>
-              </a:spcAft>
-              <a:buNone/>
-            </a:pPr>
-            <a:r>
-              <a:t/>
-            </a:r>
-            <a:endParaRPr/>
-          </a:p>
-          <a:p>
-            <a:pPr indent="0" lvl="0" marL="0">
-              <a:spcBef>
-                <a:spcPts val="0"/>
-              </a:spcBef>
-              <a:spcAft>
-                <a:spcPts val="0"/>
-              </a:spcAft>
-              <a:buNone/>
-            </a:pPr>
-            <a:r>
-              <a:rPr lang="en-US"/>
-              <a:t>Then we are going to look at curl, </a:t>
-            </a:r>
-            <a:r>
-              <a:rPr lang="en-US">
-                <a:solidFill>
-                  <a:schemeClr val="dk1"/>
-                </a:solidFill>
-              </a:rPr>
-              <a:t>curl is a tool to transfer data from or to a server, We are going to use it to get data from the memegen link, which we will have completed with our variables.</a:t>
-            </a:r>
-            <a:endParaRPr>
-              <a:solidFill>
-                <a:schemeClr val="dk1"/>
-              </a:solidFill>
-            </a:endParaRPr>
-          </a:p>
-          <a:p>
-            <a:pPr indent="0" lvl="0" marL="0">
-              <a:spcBef>
-                <a:spcPts val="0"/>
-              </a:spcBef>
-              <a:spcAft>
-                <a:spcPts val="0"/>
-              </a:spcAft>
-              <a:buClr>
-                <a:schemeClr val="dk1"/>
-              </a:buClr>
-              <a:buSzPts val="1100"/>
-              <a:buFont typeface="Arial"/>
-              <a:buNone/>
-            </a:pPr>
-            <a:r>
-              <a:t/>
-            </a:r>
-            <a:endParaRPr>
-              <a:solidFill>
-                <a:schemeClr val="dk1"/>
-              </a:solidFill>
-            </a:endParaRPr>
-          </a:p>
-          <a:p>
-            <a:pPr indent="0" lvl="0" marL="0">
-              <a:spcBef>
-                <a:spcPts val="0"/>
-              </a:spcBef>
-              <a:spcAft>
-                <a:spcPts val="0"/>
-              </a:spcAft>
-              <a:buNone/>
-            </a:pPr>
-            <a:r>
-              <a:rPr lang="en-US"/>
-              <a:t>There’s a thing you may or may not have heard about called file redirection,</a:t>
-            </a:r>
-            <a:r>
-              <a:rPr lang="en-US"/>
-              <a:t> it’s a main feature of bash, basically it allows you to direct where your stdout and stderr goes, generating new files in the process. Here we are just directing the output of curl to a file called meme.jpg</a:t>
-            </a:r>
-            <a:endParaRPr/>
-          </a:p>
-          <a:p>
-            <a:pPr indent="0" lvl="0" marL="0">
-              <a:spcBef>
-                <a:spcPts val="0"/>
-              </a:spcBef>
-              <a:spcAft>
-                <a:spcPts val="0"/>
-              </a:spcAft>
               <a:buNone/>
             </a:pPr>
             <a:r>
@@ -2669,7 +3062,7 @@
   <p:cSld>
     <p:spTree>
       <p:nvGrpSpPr>
-        <p:cNvPr id="104" name="Shape 104"/>
+        <p:cNvPr id="103" name="Shape 103"/>
         <p:cNvGrpSpPr/>
         <p:nvPr/>
       </p:nvGrpSpPr>
@@ -2683,7 +3076,7 @@
       </p:grpSpPr>
       <p:sp>
         <p:nvSpPr>
-          <p:cNvPr id="105" name="Shape 105"/>
+          <p:cNvPr id="104" name="Shape 104"/>
           <p:cNvSpPr/>
           <p:nvPr>
             <p:ph idx="2" type="sldImg"/>
@@ -2717,7 +3110,7 @@
       </p:sp>
       <p:sp>
         <p:nvSpPr>
-          <p:cNvPr id="106" name="Shape 106"/>
+          <p:cNvPr id="105" name="Shape 105"/>
           <p:cNvSpPr txBox="1"/>
           <p:nvPr>
             <p:ph idx="1" type="body"/>
@@ -2737,6 +3130,200 @@
             <a:noAutofit/>
           </a:bodyPr>
           <a:lstStyle/>
+          <a:p>
+            <a:pPr indent="0" lvl="0" marL="0">
+              <a:spcBef>
+                <a:spcPts val="0"/>
+              </a:spcBef>
+              <a:spcAft>
+                <a:spcPts val="0"/>
+              </a:spcAft>
+              <a:buClr>
+                <a:schemeClr val="dk1"/>
+              </a:buClr>
+              <a:buSzPts val="1100"/>
+              <a:buFont typeface="Arial"/>
+              <a:buNone/>
+            </a:pPr>
+            <a:r>
+              <a:rPr lang="en-US">
+                <a:solidFill>
+                  <a:schemeClr val="dk1"/>
+                </a:solidFill>
+              </a:rPr>
+              <a:t>We are going to be dividing this talk into 5 different sections or iterations. If I was you, I’d have a file per iteration, you see every iteration is going to work, they’re all just going to be a little better than the previous version in terms of usability and functionality.</a:t>
+            </a:r>
+            <a:endParaRPr>
+              <a:solidFill>
+                <a:schemeClr val="dk1"/>
+              </a:solidFill>
+            </a:endParaRPr>
+          </a:p>
+          <a:p>
+            <a:pPr indent="0" lvl="0" marL="0">
+              <a:spcBef>
+                <a:spcPts val="0"/>
+              </a:spcBef>
+              <a:spcAft>
+                <a:spcPts val="0"/>
+              </a:spcAft>
+              <a:buNone/>
+            </a:pPr>
+            <a:r>
+              <a:t/>
+            </a:r>
+            <a:endParaRPr/>
+          </a:p>
+          <a:p>
+            <a:pPr indent="0" lvl="0" marL="0">
+              <a:spcBef>
+                <a:spcPts val="0"/>
+              </a:spcBef>
+              <a:spcAft>
+                <a:spcPts val="0"/>
+              </a:spcAft>
+              <a:buNone/>
+            </a:pPr>
+            <a:r>
+              <a:rPr lang="en-US"/>
+              <a:t>So let’s get started, I want everyone here to power on there machines and fire up a terminal.</a:t>
+            </a:r>
+            <a:endParaRPr/>
+          </a:p>
+          <a:p>
+            <a:pPr indent="0" lvl="0" marL="0">
+              <a:spcBef>
+                <a:spcPts val="0"/>
+              </a:spcBef>
+              <a:spcAft>
+                <a:spcPts val="0"/>
+              </a:spcAft>
+              <a:buNone/>
+            </a:pPr>
+            <a:r>
+              <a:t/>
+            </a:r>
+            <a:endParaRPr/>
+          </a:p>
+          <a:p>
+            <a:pPr indent="0" lvl="0" marL="0">
+              <a:spcBef>
+                <a:spcPts val="0"/>
+              </a:spcBef>
+              <a:spcAft>
+                <a:spcPts val="0"/>
+              </a:spcAft>
+              <a:buNone/>
+            </a:pPr>
+            <a:r>
+              <a:rPr lang="en-US"/>
+              <a:t>We all ready?</a:t>
+            </a:r>
+            <a:endParaRPr/>
+          </a:p>
+          <a:p>
+            <a:pPr indent="0" lvl="0" marL="0">
+              <a:spcBef>
+                <a:spcPts val="0"/>
+              </a:spcBef>
+              <a:spcAft>
+                <a:spcPts val="0"/>
+              </a:spcAft>
+              <a:buNone/>
+            </a:pPr>
+            <a:r>
+              <a:rPr lang="en-US"/>
+              <a:t>Okay so real quick, in this first iteration we will be going over a few things in particular. Firstly you’ll be seeing how to take user input with BASH, and furthermore you’ll see how variables work.</a:t>
+            </a:r>
+            <a:endParaRPr/>
+          </a:p>
+          <a:p>
+            <a:pPr indent="0" lvl="0" marL="0">
+              <a:spcBef>
+                <a:spcPts val="0"/>
+              </a:spcBef>
+              <a:spcAft>
+                <a:spcPts val="0"/>
+              </a:spcAft>
+              <a:buNone/>
+            </a:pPr>
+            <a:r>
+              <a:t/>
+            </a:r>
+            <a:endParaRPr/>
+          </a:p>
+          <a:p>
+            <a:pPr indent="0" lvl="0" marL="0">
+              <a:spcBef>
+                <a:spcPts val="0"/>
+              </a:spcBef>
+              <a:spcAft>
+                <a:spcPts val="0"/>
+              </a:spcAft>
+              <a:buNone/>
+            </a:pPr>
+            <a:r>
+              <a:rPr lang="en-US"/>
+              <a:t>Then we are going to look at curl, </a:t>
+            </a:r>
+            <a:r>
+              <a:rPr lang="en-US">
+                <a:solidFill>
+                  <a:schemeClr val="dk1"/>
+                </a:solidFill>
+              </a:rPr>
+              <a:t>curl is a tool to transfer data from or to a server, We are going to use it to get data from the memegen link, which we will have completed with our variables.</a:t>
+            </a:r>
+            <a:endParaRPr>
+              <a:solidFill>
+                <a:schemeClr val="dk1"/>
+              </a:solidFill>
+            </a:endParaRPr>
+          </a:p>
+          <a:p>
+            <a:pPr indent="0" lvl="0" marL="0">
+              <a:spcBef>
+                <a:spcPts val="0"/>
+              </a:spcBef>
+              <a:spcAft>
+                <a:spcPts val="0"/>
+              </a:spcAft>
+              <a:buClr>
+                <a:schemeClr val="dk1"/>
+              </a:buClr>
+              <a:buSzPts val="1100"/>
+              <a:buFont typeface="Arial"/>
+              <a:buNone/>
+            </a:pPr>
+            <a:r>
+              <a:t/>
+            </a:r>
+            <a:endParaRPr>
+              <a:solidFill>
+                <a:schemeClr val="dk1"/>
+              </a:solidFill>
+            </a:endParaRPr>
+          </a:p>
+          <a:p>
+            <a:pPr indent="0" lvl="0" marL="0">
+              <a:spcBef>
+                <a:spcPts val="0"/>
+              </a:spcBef>
+              <a:spcAft>
+                <a:spcPts val="0"/>
+              </a:spcAft>
+              <a:buNone/>
+            </a:pPr>
+            <a:r>
+              <a:rPr lang="en-US"/>
+              <a:t>There’s a thing you may or may not have heard about called file redirection,</a:t>
+            </a:r>
+            <a:r>
+              <a:rPr lang="en-US"/>
+              <a:t> it’s a main feature of bash, basically it allows you to direct where your stdout and stderr goes, generating new files in the process. Here we are just directing the output of curl to a file called meme.jpg</a:t>
+            </a:r>
+            <a:endParaRPr/>
+          </a:p>
           <a:p>
             <a:pPr indent="0" lvl="0" marL="0">
               <a:spcBef>
@@ -2846,40 +3433,7 @@
               <a:buNone/>
             </a:pPr>
             <a:r>
-              <a:rPr lang="en-US"/>
-              <a:t>If statements have a weird syntax in bash compared to other languages.</a:t>
-            </a:r>
-            <a:endParaRPr/>
-          </a:p>
-          <a:p>
-            <a:pPr indent="0" lvl="0" marL="0">
-              <a:spcBef>
-                <a:spcPts val="0"/>
-              </a:spcBef>
-              <a:spcAft>
-                <a:spcPts val="0"/>
-              </a:spcAft>
-              <a:buNone/>
-            </a:pPr>
-            <a:r>
-              <a:rPr lang="en-US"/>
-              <a:t>The condition is surrounded by two square brackets and followed by a semicolon and the "then" keyword.</a:t>
-            </a:r>
-            <a:endParaRPr/>
-          </a:p>
-          <a:p>
-            <a:pPr indent="0" lvl="0" marL="0">
-              <a:spcBef>
-                <a:spcPts val="0"/>
-              </a:spcBef>
-              <a:spcAft>
-                <a:spcPts val="0"/>
-              </a:spcAft>
-              <a:buNone/>
-            </a:pPr>
-            <a:r>
-              <a:rPr lang="en-US"/>
-              <a:t>Every block statement in bash, such as if and case, is closed by the keyword backwards: fi, esac, etc.</a:t>
+              <a:t/>
             </a:r>
             <a:endParaRPr/>
           </a:p>
@@ -2898,7 +3452,7 @@
   <p:cSld>
     <p:spTree>
       <p:nvGrpSpPr>
-        <p:cNvPr id="115" name="Shape 115"/>
+        <p:cNvPr id="114" name="Shape 114"/>
         <p:cNvGrpSpPr/>
         <p:nvPr/>
       </p:nvGrpSpPr>
@@ -2912,7 +3466,7 @@
       </p:grpSpPr>
       <p:sp>
         <p:nvSpPr>
-          <p:cNvPr id="116" name="Shape 116"/>
+          <p:cNvPr id="115" name="Shape 115"/>
           <p:cNvSpPr/>
           <p:nvPr>
             <p:ph idx="2" type="sldImg"/>
@@ -2946,7 +3500,7 @@
       </p:sp>
       <p:sp>
         <p:nvSpPr>
-          <p:cNvPr id="117" name="Shape 117"/>
+          <p:cNvPr id="116" name="Shape 116"/>
           <p:cNvSpPr txBox="1"/>
           <p:nvPr>
             <p:ph idx="1" type="body"/>
@@ -3076,7 +3630,7 @@
             </a:pPr>
             <a:r>
               <a:rPr lang="en-US"/>
-              <a:t>Now yeah, we have a working script, but it’s not scriptable. For something to be scriptable we mean that it can be extended or automated through scripting.</a:t>
+              <a:t>If statements have a weird syntax in bash compared to other languages.</a:t>
             </a:r>
             <a:endParaRPr/>
           </a:p>
@@ -3091,7 +3645,8 @@
               <a:buNone/>
             </a:pPr>
             <a:r>
-              <a:t/>
+              <a:rPr lang="en-US"/>
+              <a:t>The condition is surrounded by two square brackets and followed by a semicolon and the "then" keyword.</a:t>
             </a:r>
             <a:endParaRPr/>
           </a:p>
@@ -3103,70 +3658,11 @@
               <a:spcAft>
                 <a:spcPts val="0"/>
               </a:spcAft>
-              <a:buClr>
-                <a:schemeClr val="dk1"/>
-              </a:buClr>
-              <a:buSzPts val="1100"/>
-              <a:buFont typeface="Arial"/>
-              <a:buNone/>
-            </a:pPr>
-            <a:r>
-              <a:rPr lang="en-US">
-                <a:solidFill>
-                  <a:schemeClr val="dk1"/>
-                </a:solidFill>
-              </a:rPr>
-              <a:t>User input is fine, but we’d rather just fill in the meme information as command line arguments. That way it’s all on the one line, making it easier for someone to use. In all, we are just reducing the wait time the exists between you and your meme.</a:t>
-            </a:r>
-            <a:endParaRPr/>
-          </a:p>
-          <a:p>
-            <a:pPr indent="0" lvl="0" marL="0">
-              <a:spcBef>
-                <a:spcPts val="0"/>
-              </a:spcBef>
-              <a:spcAft>
-                <a:spcPts val="0"/>
-              </a:spcAft>
-              <a:buNone/>
-            </a:pPr>
-            <a:r>
-              <a:t/>
-            </a:r>
-            <a:endParaRPr/>
-          </a:p>
-          <a:p>
-            <a:pPr indent="0" lvl="0" marL="0">
-              <a:spcBef>
-                <a:spcPts val="0"/>
-              </a:spcBef>
-              <a:spcAft>
-                <a:spcPts val="0"/>
-              </a:spcAft>
               <a:buNone/>
             </a:pPr>
             <a:r>
               <a:rPr lang="en-US"/>
-              <a:t>We use functions to separate blocks of code, </a:t>
-            </a:r>
-            <a:r>
-              <a:rPr lang="en-US"/>
-              <a:t>it’ll make more sense as to why this is done in the next iteration of our program.</a:t>
-            </a:r>
-            <a:endParaRPr/>
-          </a:p>
-          <a:p>
-            <a:pPr indent="0" lvl="0" marL="0">
-              <a:spcBef>
-                <a:spcPts val="0"/>
-              </a:spcBef>
-              <a:spcAft>
-                <a:spcPts val="0"/>
-              </a:spcAft>
-              <a:buNone/>
-            </a:pPr>
-            <a:r>
-              <a:t/>
+              <a:t>Every block statement in bash, such as if and case, is closed by the keyword backwards: fi, esac, etc.</a:t>
             </a:r>
             <a:endParaRPr/>
           </a:p>
@@ -21290,7 +21786,7 @@
             </a:pPr>
             <a:r>
               <a:rPr lang="en-US"/>
-              <a:t>Fourth iteration</a:t>
+              <a:t>Third iteration</a:t>
             </a:r>
             <a:endParaRPr/>
           </a:p>
@@ -21334,12 +21830,12 @@
             </a:pPr>
             <a:r>
               <a:rPr lang="en-US"/>
-              <a:t>Make it only prompt the user if it has to</a:t>
+              <a:t>Make the program "scriptable"</a:t>
             </a:r>
             <a:endParaRPr/>
           </a:p>
           <a:p>
-            <a:pPr indent="-406400" lvl="0" marL="457200">
+            <a:pPr indent="-406400" lvl="0" marL="457200" rtl="0">
               <a:lnSpc>
                 <a:spcPct val="150000"/>
               </a:lnSpc>
@@ -21354,7 +21850,7 @@
             </a:pPr>
             <a:r>
               <a:rPr lang="en-US"/>
-              <a:t>Add arguments using getopts</a:t>
+              <a:t>But first we need a main function</a:t>
             </a:r>
             <a:endParaRPr/>
           </a:p>
@@ -21401,8 +21897,8 @@
         </p:blipFill>
         <p:spPr>
           <a:xfrm>
-            <a:off x="1355637" y="504824"/>
-            <a:ext cx="9480725" cy="5326551"/>
+            <a:off x="1705812" y="1053288"/>
+            <a:ext cx="8780376" cy="4751425"/>
           </a:xfrm>
           <a:prstGeom prst="rect">
             <a:avLst/>
@@ -21438,62 +21934,9 @@
           <a:chExt cx="0" cy="0"/>
         </a:xfrm>
       </p:grpSpPr>
-      <p:pic>
-        <p:nvPicPr>
-          <p:cNvPr id="146" name="Shape 146"/>
-          <p:cNvPicPr preferRelativeResize="0"/>
-          <p:nvPr/>
-        </p:nvPicPr>
-        <p:blipFill>
-          <a:blip r:embed="rId3">
-            <a:alphaModFix/>
-          </a:blip>
-          <a:stretch>
-            <a:fillRect/>
-          </a:stretch>
-        </p:blipFill>
-        <p:spPr>
-          <a:xfrm>
-            <a:off x="997225" y="152400"/>
-            <a:ext cx="7133863" cy="6553199"/>
-          </a:xfrm>
-          <a:prstGeom prst="rect">
-            <a:avLst/>
-          </a:prstGeom>
-          <a:noFill/>
-          <a:ln>
-            <a:noFill/>
-          </a:ln>
-        </p:spPr>
-      </p:pic>
-    </p:spTree>
-  </p:cSld>
-  <p:clrMapOvr>
-    <a:masterClrMapping/>
-  </p:clrMapOvr>
-</p:sld>
-</file>
-
-<file path=ppt/slides/slide13.xml><?xml version="1.0" encoding="utf-8"?>
-<p:sld xmlns:a="http://schemas.openxmlformats.org/drawingml/2006/main" xmlns:r="http://schemas.openxmlformats.org/officeDocument/2006/relationships" xmlns:mc="http://schemas.openxmlformats.org/markup-compatibility/2006" xmlns:mv="urn:schemas-microsoft-com:mac:vml" xmlns:p="http://schemas.openxmlformats.org/presentationml/2006/main" xmlns:c="http://schemas.openxmlformats.org/drawingml/2006/chart" xmlns:dgm="http://schemas.openxmlformats.org/drawingml/2006/diagram" xmlns:o="urn:schemas-microsoft-com:office:office" xmlns:v="urn:schemas-microsoft-com:vml" xmlns:pvml="urn:schemas-microsoft-com:office:powerpoint" xmlns:com="http://schemas.openxmlformats.org/drawingml/2006/compatibility" xmlns:p14="http://schemas.microsoft.com/office/powerpoint/2010/main" xmlns:p15="http://schemas.microsoft.com/office/powerpoint/2012/main">
-  <p:cSld>
-    <p:spTree>
-      <p:nvGrpSpPr>
-        <p:cNvPr id="150" name="Shape 150"/>
-        <p:cNvGrpSpPr/>
-        <p:nvPr/>
-      </p:nvGrpSpPr>
-      <p:grpSpPr>
-        <a:xfrm>
-          <a:off x="0" y="0"/>
-          <a:ext cx="0" cy="0"/>
-          <a:chOff x="0" y="0"/>
-          <a:chExt cx="0" cy="0"/>
-        </a:xfrm>
-      </p:grpSpPr>
       <p:sp>
         <p:nvSpPr>
-          <p:cNvPr id="151" name="Shape 151"/>
+          <p:cNvPr id="146" name="Shape 146"/>
           <p:cNvSpPr txBox="1"/>
           <p:nvPr>
             <p:ph type="title"/>
@@ -21525,7 +21968,7 @@
             </a:pPr>
             <a:r>
               <a:rPr lang="en-US"/>
-              <a:t>Final iteration</a:t>
+              <a:t>Fourth iteration</a:t>
             </a:r>
             <a:endParaRPr/>
           </a:p>
@@ -21533,7 +21976,7 @@
       </p:sp>
       <p:sp>
         <p:nvSpPr>
-          <p:cNvPr id="152" name="Shape 152"/>
+          <p:cNvPr id="147" name="Shape 147"/>
           <p:cNvSpPr txBox="1"/>
           <p:nvPr>
             <p:ph idx="1" type="body"/>
@@ -21569,12 +22012,12 @@
             </a:pPr>
             <a:r>
               <a:rPr lang="en-US"/>
-              <a:t>Usability</a:t>
+              <a:t>Make it only prompt the user if it has to</a:t>
             </a:r>
             <a:endParaRPr/>
           </a:p>
           <a:p>
-            <a:pPr indent="-406400" lvl="0" marL="457200" rtl="0">
+            <a:pPr indent="-406400" lvl="0" marL="457200">
               <a:lnSpc>
                 <a:spcPct val="150000"/>
               </a:lnSpc>
@@ -21589,32 +22032,65 @@
             </a:pPr>
             <a:r>
               <a:rPr lang="en-US"/>
-              <a:t>Usage string</a:t>
-            </a:r>
-            <a:endParaRPr/>
-          </a:p>
-          <a:p>
-            <a:pPr indent="-406400" lvl="0" marL="457200">
-              <a:lnSpc>
-                <a:spcPct val="150000"/>
-              </a:lnSpc>
-              <a:spcBef>
-                <a:spcPts val="0"/>
-              </a:spcBef>
-              <a:spcAft>
-                <a:spcPts val="0"/>
-              </a:spcAft>
-              <a:buSzPts val="2800"/>
-              <a:buChar char="•"/>
-            </a:pPr>
-            <a:r>
-              <a:rPr lang="en-US"/>
-              <a:t>Cat and EOF</a:t>
+              <a:t>Add arguments using getopts</a:t>
             </a:r>
             <a:endParaRPr/>
           </a:p>
         </p:txBody>
       </p:sp>
+    </p:spTree>
+  </p:cSld>
+  <p:clrMapOvr>
+    <a:masterClrMapping/>
+  </p:clrMapOvr>
+</p:sld>
+</file>
+
+<file path=ppt/slides/slide13.xml><?xml version="1.0" encoding="utf-8"?>
+<p:sld xmlns:a="http://schemas.openxmlformats.org/drawingml/2006/main" xmlns:r="http://schemas.openxmlformats.org/officeDocument/2006/relationships" xmlns:mc="http://schemas.openxmlformats.org/markup-compatibility/2006" xmlns:mv="urn:schemas-microsoft-com:mac:vml" xmlns:p="http://schemas.openxmlformats.org/presentationml/2006/main" xmlns:c="http://schemas.openxmlformats.org/drawingml/2006/chart" xmlns:dgm="http://schemas.openxmlformats.org/drawingml/2006/diagram" xmlns:o="urn:schemas-microsoft-com:office:office" xmlns:v="urn:schemas-microsoft-com:vml" xmlns:pvml="urn:schemas-microsoft-com:office:powerpoint" xmlns:com="http://schemas.openxmlformats.org/drawingml/2006/compatibility" xmlns:p14="http://schemas.microsoft.com/office/powerpoint/2010/main" xmlns:p15="http://schemas.microsoft.com/office/powerpoint/2012/main">
+  <p:cSld>
+    <p:spTree>
+      <p:nvGrpSpPr>
+        <p:cNvPr id="151" name="Shape 151"/>
+        <p:cNvGrpSpPr/>
+        <p:nvPr/>
+      </p:nvGrpSpPr>
+      <p:grpSpPr>
+        <a:xfrm>
+          <a:off x="0" y="0"/>
+          <a:ext cx="0" cy="0"/>
+          <a:chOff x="0" y="0"/>
+          <a:chExt cx="0" cy="0"/>
+        </a:xfrm>
+      </p:grpSpPr>
+      <p:pic>
+        <p:nvPicPr>
+          <p:cNvPr id="152" name="Shape 152"/>
+          <p:cNvPicPr preferRelativeResize="0"/>
+          <p:nvPr/>
+        </p:nvPicPr>
+        <p:blipFill>
+          <a:blip r:embed="rId3">
+            <a:alphaModFix/>
+          </a:blip>
+          <a:stretch>
+            <a:fillRect/>
+          </a:stretch>
+        </p:blipFill>
+        <p:spPr>
+          <a:xfrm>
+            <a:off x="1355637" y="504824"/>
+            <a:ext cx="9480725" cy="5326551"/>
+          </a:xfrm>
+          <a:prstGeom prst="rect">
+            <a:avLst/>
+          </a:prstGeom>
+          <a:noFill/>
+          <a:ln>
+            <a:noFill/>
+          </a:ln>
+        </p:spPr>
+      </p:pic>
     </p:spTree>
   </p:cSld>
   <p:clrMapOvr>
@@ -21656,8 +22132,8 @@
         </p:blipFill>
         <p:spPr>
           <a:xfrm>
-            <a:off x="1022075" y="152400"/>
-            <a:ext cx="6693175" cy="6553200"/>
+            <a:off x="997225" y="152400"/>
+            <a:ext cx="7133863" cy="6553199"/>
           </a:xfrm>
           <a:prstGeom prst="rect">
             <a:avLst/>
@@ -21693,9 +22169,284 @@
           <a:chExt cx="0" cy="0"/>
         </a:xfrm>
       </p:grpSpPr>
+      <p:sp>
+        <p:nvSpPr>
+          <p:cNvPr id="162" name="Shape 162"/>
+          <p:cNvSpPr txBox="1"/>
+          <p:nvPr>
+            <p:ph type="title"/>
+          </p:nvPr>
+        </p:nvSpPr>
+        <p:spPr>
+          <a:xfrm>
+            <a:off x="838200" y="365125"/>
+            <a:ext cx="10515600" cy="1325700"/>
+          </a:xfrm>
+          <a:prstGeom prst="rect">
+            <a:avLst/>
+          </a:prstGeom>
+        </p:spPr>
+        <p:txBody>
+          <a:bodyPr anchorCtr="0" anchor="ctr" bIns="91425" lIns="91425" spcFirstLastPara="1" rIns="91425" wrap="square" tIns="91425">
+            <a:noAutofit/>
+          </a:bodyPr>
+          <a:lstStyle/>
+          <a:p>
+            <a:pPr indent="0" lvl="0" marL="0">
+              <a:spcBef>
+                <a:spcPts val="0"/>
+              </a:spcBef>
+              <a:spcAft>
+                <a:spcPts val="0"/>
+              </a:spcAft>
+              <a:buNone/>
+            </a:pPr>
+            <a:r>
+              <a:rPr lang="en-US"/>
+              <a:t>Final iteration</a:t>
+            </a:r>
+            <a:endParaRPr/>
+          </a:p>
+        </p:txBody>
+      </p:sp>
+      <p:sp>
+        <p:nvSpPr>
+          <p:cNvPr id="163" name="Shape 163"/>
+          <p:cNvSpPr txBox="1"/>
+          <p:nvPr>
+            <p:ph idx="1" type="body"/>
+          </p:nvPr>
+        </p:nvSpPr>
+        <p:spPr>
+          <a:xfrm>
+            <a:off x="838200" y="1825625"/>
+            <a:ext cx="10515600" cy="4351200"/>
+          </a:xfrm>
+          <a:prstGeom prst="rect">
+            <a:avLst/>
+          </a:prstGeom>
+        </p:spPr>
+        <p:txBody>
+          <a:bodyPr anchorCtr="0" anchor="t" bIns="91425" lIns="91425" spcFirstLastPara="1" rIns="91425" wrap="square" tIns="91425">
+            <a:noAutofit/>
+          </a:bodyPr>
+          <a:lstStyle/>
+          <a:p>
+            <a:pPr indent="-406400" lvl="0" marL="457200" rtl="0">
+              <a:lnSpc>
+                <a:spcPct val="150000"/>
+              </a:lnSpc>
+              <a:spcBef>
+                <a:spcPts val="1000"/>
+              </a:spcBef>
+              <a:spcAft>
+                <a:spcPts val="0"/>
+              </a:spcAft>
+              <a:buSzPts val="2800"/>
+              <a:buChar char="•"/>
+            </a:pPr>
+            <a:r>
+              <a:rPr lang="en-US"/>
+              <a:t>Usability</a:t>
+            </a:r>
+            <a:endParaRPr/>
+          </a:p>
+          <a:p>
+            <a:pPr indent="-406400" lvl="0" marL="457200" rtl="0">
+              <a:lnSpc>
+                <a:spcPct val="150000"/>
+              </a:lnSpc>
+              <a:spcBef>
+                <a:spcPts val="0"/>
+              </a:spcBef>
+              <a:spcAft>
+                <a:spcPts val="0"/>
+              </a:spcAft>
+              <a:buSzPts val="2800"/>
+              <a:buChar char="•"/>
+            </a:pPr>
+            <a:r>
+              <a:rPr lang="en-US"/>
+              <a:t>Usage string</a:t>
+            </a:r>
+            <a:endParaRPr/>
+          </a:p>
+          <a:p>
+            <a:pPr indent="-406400" lvl="0" marL="457200" rtl="0">
+              <a:lnSpc>
+                <a:spcPct val="150000"/>
+              </a:lnSpc>
+              <a:spcBef>
+                <a:spcPts val="0"/>
+              </a:spcBef>
+              <a:spcAft>
+                <a:spcPts val="0"/>
+              </a:spcAft>
+              <a:buSzPts val="2800"/>
+              <a:buChar char="•"/>
+            </a:pPr>
+            <a:r>
+              <a:rPr lang="en-US"/>
+              <a:t>Cat and EOF</a:t>
+            </a:r>
+            <a:endParaRPr/>
+          </a:p>
+          <a:p>
+            <a:pPr indent="-406400" lvl="0" marL="457200">
+              <a:lnSpc>
+                <a:spcPct val="150000"/>
+              </a:lnSpc>
+              <a:spcBef>
+                <a:spcPts val="0"/>
+              </a:spcBef>
+              <a:spcAft>
+                <a:spcPts val="0"/>
+              </a:spcAft>
+              <a:buSzPts val="2800"/>
+              <a:buChar char="•"/>
+            </a:pPr>
+            <a:r>
+              <a:rPr lang="en-US"/>
+              <a:t>Swapping out curl for wget</a:t>
+            </a:r>
+            <a:endParaRPr/>
+          </a:p>
+        </p:txBody>
+      </p:sp>
+    </p:spTree>
+  </p:cSld>
+  <p:clrMapOvr>
+    <a:masterClrMapping/>
+  </p:clrMapOvr>
+</p:sld>
+</file>
+
+<file path=ppt/slides/slide16.xml><?xml version="1.0" encoding="utf-8"?>
+<p:sld xmlns:a="http://schemas.openxmlformats.org/drawingml/2006/main" xmlns:r="http://schemas.openxmlformats.org/officeDocument/2006/relationships" xmlns:mc="http://schemas.openxmlformats.org/markup-compatibility/2006" xmlns:mv="urn:schemas-microsoft-com:mac:vml" xmlns:p="http://schemas.openxmlformats.org/presentationml/2006/main" xmlns:c="http://schemas.openxmlformats.org/drawingml/2006/chart" xmlns:dgm="http://schemas.openxmlformats.org/drawingml/2006/diagram" xmlns:o="urn:schemas-microsoft-com:office:office" xmlns:v="urn:schemas-microsoft-com:vml" xmlns:pvml="urn:schemas-microsoft-com:office:powerpoint" xmlns:com="http://schemas.openxmlformats.org/drawingml/2006/compatibility" xmlns:p14="http://schemas.microsoft.com/office/powerpoint/2010/main" xmlns:p15="http://schemas.microsoft.com/office/powerpoint/2012/main">
+  <p:cSld>
+    <p:spTree>
+      <p:nvGrpSpPr>
+        <p:cNvPr id="167" name="Shape 167"/>
+        <p:cNvGrpSpPr/>
+        <p:nvPr/>
+      </p:nvGrpSpPr>
+      <p:grpSpPr>
+        <a:xfrm>
+          <a:off x="0" y="0"/>
+          <a:ext cx="0" cy="0"/>
+          <a:chOff x="0" y="0"/>
+          <a:chExt cx="0" cy="0"/>
+        </a:xfrm>
+      </p:grpSpPr>
       <p:pic>
         <p:nvPicPr>
-          <p:cNvPr id="162" name="Shape 162"/>
+          <p:cNvPr id="168" name="Shape 168"/>
+          <p:cNvPicPr preferRelativeResize="0"/>
+          <p:nvPr/>
+        </p:nvPicPr>
+        <p:blipFill>
+          <a:blip r:embed="rId3">
+            <a:alphaModFix/>
+          </a:blip>
+          <a:stretch>
+            <a:fillRect/>
+          </a:stretch>
+        </p:blipFill>
+        <p:spPr>
+          <a:xfrm>
+            <a:off x="1022075" y="152400"/>
+            <a:ext cx="6693175" cy="6553200"/>
+          </a:xfrm>
+          <a:prstGeom prst="rect">
+            <a:avLst/>
+          </a:prstGeom>
+          <a:noFill/>
+          <a:ln>
+            <a:noFill/>
+          </a:ln>
+        </p:spPr>
+      </p:pic>
+    </p:spTree>
+  </p:cSld>
+  <p:clrMapOvr>
+    <a:masterClrMapping/>
+  </p:clrMapOvr>
+</p:sld>
+</file>
+
+<file path=ppt/slides/slide17.xml><?xml version="1.0" encoding="utf-8"?>
+<p:sld xmlns:a="http://schemas.openxmlformats.org/drawingml/2006/main" xmlns:r="http://schemas.openxmlformats.org/officeDocument/2006/relationships" xmlns:mc="http://schemas.openxmlformats.org/markup-compatibility/2006" xmlns:mv="urn:schemas-microsoft-com:mac:vml" xmlns:p="http://schemas.openxmlformats.org/presentationml/2006/main" xmlns:c="http://schemas.openxmlformats.org/drawingml/2006/chart" xmlns:dgm="http://schemas.openxmlformats.org/drawingml/2006/diagram" xmlns:o="urn:schemas-microsoft-com:office:office" xmlns:v="urn:schemas-microsoft-com:vml" xmlns:pvml="urn:schemas-microsoft-com:office:powerpoint" xmlns:com="http://schemas.openxmlformats.org/drawingml/2006/compatibility" xmlns:p14="http://schemas.microsoft.com/office/powerpoint/2010/main" xmlns:p15="http://schemas.microsoft.com/office/powerpoint/2012/main">
+  <p:cSld>
+    <p:spTree>
+      <p:nvGrpSpPr>
+        <p:cNvPr id="172" name="Shape 172"/>
+        <p:cNvGrpSpPr/>
+        <p:nvPr/>
+      </p:nvGrpSpPr>
+      <p:grpSpPr>
+        <a:xfrm>
+          <a:off x="0" y="0"/>
+          <a:ext cx="0" cy="0"/>
+          <a:chOff x="0" y="0"/>
+          <a:chExt cx="0" cy="0"/>
+        </a:xfrm>
+      </p:grpSpPr>
+      <p:pic>
+        <p:nvPicPr>
+          <p:cNvPr id="173" name="Shape 173"/>
+          <p:cNvPicPr preferRelativeResize="0"/>
+          <p:nvPr/>
+        </p:nvPicPr>
+        <p:blipFill>
+          <a:blip r:embed="rId3">
+            <a:alphaModFix/>
+          </a:blip>
+          <a:stretch>
+            <a:fillRect/>
+          </a:stretch>
+        </p:blipFill>
+        <p:spPr>
+          <a:xfrm>
+            <a:off x="1020899" y="255050"/>
+            <a:ext cx="8964724" cy="5494499"/>
+          </a:xfrm>
+          <a:prstGeom prst="rect">
+            <a:avLst/>
+          </a:prstGeom>
+          <a:noFill/>
+          <a:ln>
+            <a:noFill/>
+          </a:ln>
+        </p:spPr>
+      </p:pic>
+    </p:spTree>
+  </p:cSld>
+  <p:clrMapOvr>
+    <a:masterClrMapping/>
+  </p:clrMapOvr>
+</p:sld>
+</file>
+
+<file path=ppt/slides/slide18.xml><?xml version="1.0" encoding="utf-8"?>
+<p:sld xmlns:a="http://schemas.openxmlformats.org/drawingml/2006/main" xmlns:r="http://schemas.openxmlformats.org/officeDocument/2006/relationships" xmlns:mc="http://schemas.openxmlformats.org/markup-compatibility/2006" xmlns:mv="urn:schemas-microsoft-com:mac:vml" xmlns:p="http://schemas.openxmlformats.org/presentationml/2006/main" xmlns:c="http://schemas.openxmlformats.org/drawingml/2006/chart" xmlns:dgm="http://schemas.openxmlformats.org/drawingml/2006/diagram" xmlns:o="urn:schemas-microsoft-com:office:office" xmlns:v="urn:schemas-microsoft-com:vml" xmlns:pvml="urn:schemas-microsoft-com:office:powerpoint" xmlns:com="http://schemas.openxmlformats.org/drawingml/2006/compatibility" xmlns:p14="http://schemas.microsoft.com/office/powerpoint/2010/main" xmlns:p15="http://schemas.microsoft.com/office/powerpoint/2012/main">
+  <p:cSld>
+    <p:spTree>
+      <p:nvGrpSpPr>
+        <p:cNvPr id="177" name="Shape 177"/>
+        <p:cNvGrpSpPr/>
+        <p:nvPr/>
+      </p:nvGrpSpPr>
+      <p:grpSpPr>
+        <a:xfrm>
+          <a:off x="0" y="0"/>
+          <a:ext cx="0" cy="0"/>
+          <a:chOff x="0" y="0"/>
+          <a:chExt cx="0" cy="0"/>
+        </a:xfrm>
+      </p:grpSpPr>
+      <p:pic>
+        <p:nvPicPr>
+          <p:cNvPr id="178" name="Shape 178"/>
           <p:cNvPicPr preferRelativeResize="0"/>
           <p:nvPr/>
         </p:nvPicPr>
@@ -21729,12 +22480,12 @@
 </p:sld>
 </file>
 
-<file path=ppt/slides/slide16.xml><?xml version="1.0" encoding="utf-8"?>
+<file path=ppt/slides/slide19.xml><?xml version="1.0" encoding="utf-8"?>
 <p:sld xmlns:a="http://schemas.openxmlformats.org/drawingml/2006/main" xmlns:r="http://schemas.openxmlformats.org/officeDocument/2006/relationships" xmlns:mc="http://schemas.openxmlformats.org/markup-compatibility/2006" xmlns:mv="urn:schemas-microsoft-com:mac:vml" xmlns:p="http://schemas.openxmlformats.org/presentationml/2006/main" xmlns:c="http://schemas.openxmlformats.org/drawingml/2006/chart" xmlns:dgm="http://schemas.openxmlformats.org/drawingml/2006/diagram" xmlns:o="urn:schemas-microsoft-com:office:office" xmlns:v="urn:schemas-microsoft-com:vml" xmlns:pvml="urn:schemas-microsoft-com:office:powerpoint" xmlns:com="http://schemas.openxmlformats.org/drawingml/2006/compatibility" xmlns:p14="http://schemas.microsoft.com/office/powerpoint/2010/main" xmlns:p15="http://schemas.microsoft.com/office/powerpoint/2012/main">
   <p:cSld>
     <p:spTree>
       <p:nvGrpSpPr>
-        <p:cNvPr id="166" name="Shape 166"/>
+        <p:cNvPr id="182" name="Shape 182"/>
         <p:cNvGrpSpPr/>
         <p:nvPr/>
       </p:nvGrpSpPr>
@@ -21748,7 +22499,7 @@
       </p:grpSpPr>
       <p:sp>
         <p:nvSpPr>
-          <p:cNvPr id="167" name="Shape 167"/>
+          <p:cNvPr id="183" name="Shape 183"/>
           <p:cNvSpPr txBox="1"/>
           <p:nvPr>
             <p:ph type="title"/>
@@ -22020,6 +22771,126 @@
 </p:sld>
 </file>
 
+<file path=ppt/slides/slide20.xml><?xml version="1.0" encoding="utf-8"?>
+<p:sld xmlns:a="http://schemas.openxmlformats.org/drawingml/2006/main" xmlns:r="http://schemas.openxmlformats.org/officeDocument/2006/relationships" xmlns:mc="http://schemas.openxmlformats.org/markup-compatibility/2006" xmlns:mv="urn:schemas-microsoft-com:mac:vml" xmlns:p="http://schemas.openxmlformats.org/presentationml/2006/main" xmlns:c="http://schemas.openxmlformats.org/drawingml/2006/chart" xmlns:dgm="http://schemas.openxmlformats.org/drawingml/2006/diagram" xmlns:o="urn:schemas-microsoft-com:office:office" xmlns:v="urn:schemas-microsoft-com:vml" xmlns:pvml="urn:schemas-microsoft-com:office:powerpoint" xmlns:com="http://schemas.openxmlformats.org/drawingml/2006/compatibility" xmlns:p14="http://schemas.microsoft.com/office/powerpoint/2010/main" xmlns:p15="http://schemas.microsoft.com/office/powerpoint/2012/main">
+  <p:cSld>
+    <p:spTree>
+      <p:nvGrpSpPr>
+        <p:cNvPr id="187" name="Shape 187"/>
+        <p:cNvGrpSpPr/>
+        <p:nvPr/>
+      </p:nvGrpSpPr>
+      <p:grpSpPr>
+        <a:xfrm>
+          <a:off x="0" y="0"/>
+          <a:ext cx="0" cy="0"/>
+          <a:chOff x="0" y="0"/>
+          <a:chExt cx="0" cy="0"/>
+        </a:xfrm>
+      </p:grpSpPr>
+      <p:sp>
+        <p:nvSpPr>
+          <p:cNvPr id="188" name="Shape 188"/>
+          <p:cNvSpPr txBox="1"/>
+          <p:nvPr>
+            <p:ph type="title"/>
+          </p:nvPr>
+        </p:nvSpPr>
+        <p:spPr>
+          <a:xfrm>
+            <a:off x="838200" y="365125"/>
+            <a:ext cx="10515600" cy="1325700"/>
+          </a:xfrm>
+          <a:prstGeom prst="rect">
+            <a:avLst/>
+          </a:prstGeom>
+        </p:spPr>
+        <p:txBody>
+          <a:bodyPr anchorCtr="0" anchor="ctr" bIns="91425" lIns="91425" spcFirstLastPara="1" rIns="91425" wrap="square" tIns="91425">
+            <a:noAutofit/>
+          </a:bodyPr>
+          <a:lstStyle/>
+          <a:p>
+            <a:pPr indent="0" lvl="0" marL="0">
+              <a:spcBef>
+                <a:spcPts val="0"/>
+              </a:spcBef>
+              <a:spcAft>
+                <a:spcPts val="0"/>
+              </a:spcAft>
+              <a:buNone/>
+            </a:pPr>
+            <a:r>
+              <a:rPr lang="en-US"/>
+              <a:t>Who wants Redbrick hoodies?</a:t>
+            </a:r>
+            <a:endParaRPr/>
+          </a:p>
+        </p:txBody>
+      </p:sp>
+      <p:sp>
+        <p:nvSpPr>
+          <p:cNvPr id="189" name="Shape 189"/>
+          <p:cNvSpPr txBox="1"/>
+          <p:nvPr/>
+        </p:nvSpPr>
+        <p:spPr>
+          <a:xfrm>
+            <a:off x="838200" y="1756775"/>
+            <a:ext cx="8276400" cy="2889000"/>
+          </a:xfrm>
+          <a:prstGeom prst="rect">
+            <a:avLst/>
+          </a:prstGeom>
+          <a:noFill/>
+          <a:ln>
+            <a:noFill/>
+          </a:ln>
+        </p:spPr>
+        <p:txBody>
+          <a:bodyPr anchorCtr="0" anchor="t" bIns="91425" lIns="91425" spcFirstLastPara="1" rIns="91425" wrap="square" tIns="91425">
+            <a:noAutofit/>
+          </a:bodyPr>
+          <a:lstStyle/>
+          <a:p>
+            <a:pPr indent="0" lvl="0" marL="0">
+              <a:spcBef>
+                <a:spcPts val="0"/>
+              </a:spcBef>
+              <a:spcAft>
+                <a:spcPts val="0"/>
+              </a:spcAft>
+              <a:buNone/>
+            </a:pPr>
+            <a:r>
+              <a:rPr lang="en-US" sz="2400"/>
+              <a:t>Go to </a:t>
+            </a:r>
+            <a:r>
+              <a:rPr lang="en-US" sz="2400" u="sng">
+                <a:solidFill>
+                  <a:schemeClr val="hlink"/>
+                </a:solidFill>
+                <a:hlinkClick r:id="rId3"/>
+              </a:rPr>
+              <a:t>https://redbrickdcu.typeform.com/to/PiqlH7</a:t>
+            </a:r>
+            <a:r>
+              <a:rPr lang="en-US" sz="2400"/>
+              <a:t> and fill out the form !</a:t>
+            </a:r>
+            <a:endParaRPr sz="2400"/>
+          </a:p>
+        </p:txBody>
+      </p:sp>
+    </p:spTree>
+  </p:cSld>
+  <p:clrMapOvr>
+    <a:masterClrMapping/>
+  </p:clrMapOvr>
+</p:sld>
+</file>
+
 <file path=ppt/slides/slide3.xml><?xml version="1.0" encoding="utf-8"?>
 <p:sld xmlns:a="http://schemas.openxmlformats.org/drawingml/2006/main" xmlns:r="http://schemas.openxmlformats.org/officeDocument/2006/relationships" xmlns:mc="http://schemas.openxmlformats.org/markup-compatibility/2006" xmlns:mv="urn:schemas-microsoft-com:mac:vml" xmlns:p="http://schemas.openxmlformats.org/presentationml/2006/main" xmlns:c="http://schemas.openxmlformats.org/drawingml/2006/chart" xmlns:dgm="http://schemas.openxmlformats.org/drawingml/2006/diagram" xmlns:o="urn:schemas-microsoft-com:office:office" xmlns:v="urn:schemas-microsoft-com:vml" xmlns:pvml="urn:schemas-microsoft-com:office:powerpoint" xmlns:com="http://schemas.openxmlformats.org/drawingml/2006/compatibility" xmlns:p14="http://schemas.microsoft.com/office/powerpoint/2010/main" xmlns:p15="http://schemas.microsoft.com/office/powerpoint/2012/main">
   <p:cSld>
@@ -22282,9 +23153,62 @@
           <a:chExt cx="0" cy="0"/>
         </a:xfrm>
       </p:grpSpPr>
+      <p:pic>
+        <p:nvPicPr>
+          <p:cNvPr id="102" name="Shape 102"/>
+          <p:cNvPicPr preferRelativeResize="0"/>
+          <p:nvPr/>
+        </p:nvPicPr>
+        <p:blipFill>
+          <a:blip r:embed="rId3">
+            <a:alphaModFix/>
+          </a:blip>
+          <a:stretch>
+            <a:fillRect/>
+          </a:stretch>
+        </p:blipFill>
+        <p:spPr>
+          <a:xfrm>
+            <a:off x="4002326" y="152399"/>
+            <a:ext cx="4187349" cy="6553201"/>
+          </a:xfrm>
+          <a:prstGeom prst="rect">
+            <a:avLst/>
+          </a:prstGeom>
+          <a:noFill/>
+          <a:ln>
+            <a:noFill/>
+          </a:ln>
+        </p:spPr>
+      </p:pic>
+    </p:spTree>
+  </p:cSld>
+  <p:clrMapOvr>
+    <a:masterClrMapping/>
+  </p:clrMapOvr>
+</p:sld>
+</file>
+
+<file path=ppt/slides/slide5.xml><?xml version="1.0" encoding="utf-8"?>
+<p:sld xmlns:a="http://schemas.openxmlformats.org/drawingml/2006/main" xmlns:r="http://schemas.openxmlformats.org/officeDocument/2006/relationships" xmlns:mc="http://schemas.openxmlformats.org/markup-compatibility/2006" xmlns:mv="urn:schemas-microsoft-com:mac:vml" xmlns:p="http://schemas.openxmlformats.org/presentationml/2006/main" xmlns:c="http://schemas.openxmlformats.org/drawingml/2006/chart" xmlns:dgm="http://schemas.openxmlformats.org/drawingml/2006/diagram" xmlns:o="urn:schemas-microsoft-com:office:office" xmlns:v="urn:schemas-microsoft-com:vml" xmlns:pvml="urn:schemas-microsoft-com:office:powerpoint" xmlns:com="http://schemas.openxmlformats.org/drawingml/2006/compatibility" xmlns:p14="http://schemas.microsoft.com/office/powerpoint/2010/main" xmlns:p15="http://schemas.microsoft.com/office/powerpoint/2012/main">
+  <p:cSld>
+    <p:spTree>
+      <p:nvGrpSpPr>
+        <p:cNvPr id="106" name="Shape 106"/>
+        <p:cNvGrpSpPr/>
+        <p:nvPr/>
+      </p:nvGrpSpPr>
+      <p:grpSpPr>
+        <a:xfrm>
+          <a:off x="0" y="0"/>
+          <a:ext cx="0" cy="0"/>
+          <a:chOff x="0" y="0"/>
+          <a:chExt cx="0" cy="0"/>
+        </a:xfrm>
+      </p:grpSpPr>
       <p:sp>
         <p:nvSpPr>
-          <p:cNvPr id="102" name="Shape 102"/>
+          <p:cNvPr id="107" name="Shape 107"/>
           <p:cNvSpPr txBox="1"/>
           <p:nvPr>
             <p:ph type="title"/>
@@ -22324,7 +23248,7 @@
       </p:sp>
       <p:sp>
         <p:nvSpPr>
-          <p:cNvPr id="103" name="Shape 103"/>
+          <p:cNvPr id="108" name="Shape 108"/>
           <p:cNvSpPr txBox="1"/>
           <p:nvPr>
             <p:ph idx="1" type="body"/>
@@ -22434,12 +23358,12 @@
 </p:sld>
 </file>
 
-<file path=ppt/slides/slide5.xml><?xml version="1.0" encoding="utf-8"?>
+<file path=ppt/slides/slide6.xml><?xml version="1.0" encoding="utf-8"?>
 <p:sld xmlns:a="http://schemas.openxmlformats.org/drawingml/2006/main" xmlns:r="http://schemas.openxmlformats.org/officeDocument/2006/relationships" xmlns:mc="http://schemas.openxmlformats.org/markup-compatibility/2006" xmlns:mv="urn:schemas-microsoft-com:mac:vml" xmlns:p="http://schemas.openxmlformats.org/presentationml/2006/main" xmlns:c="http://schemas.openxmlformats.org/drawingml/2006/chart" xmlns:dgm="http://schemas.openxmlformats.org/drawingml/2006/diagram" xmlns:o="urn:schemas-microsoft-com:office:office" xmlns:v="urn:schemas-microsoft-com:vml" xmlns:pvml="urn:schemas-microsoft-com:office:powerpoint" xmlns:com="http://schemas.openxmlformats.org/drawingml/2006/compatibility" xmlns:p14="http://schemas.microsoft.com/office/powerpoint/2010/main" xmlns:p15="http://schemas.microsoft.com/office/powerpoint/2012/main">
   <p:cSld>
     <p:spTree>
       <p:nvGrpSpPr>
-        <p:cNvPr id="107" name="Shape 107"/>
+        <p:cNvPr id="112" name="Shape 112"/>
         <p:cNvGrpSpPr/>
         <p:nvPr/>
       </p:nvGrpSpPr>
@@ -22453,7 +23377,7 @@
       </p:grpSpPr>
       <p:pic>
         <p:nvPicPr>
-          <p:cNvPr id="108" name="Shape 108"/>
+          <p:cNvPr id="113" name="Shape 113"/>
           <p:cNvPicPr preferRelativeResize="0"/>
           <p:nvPr/>
         </p:nvPicPr>
@@ -22487,12 +23411,12 @@
 </p:sld>
 </file>
 
-<file path=ppt/slides/slide6.xml><?xml version="1.0" encoding="utf-8"?>
+<file path=ppt/slides/slide7.xml><?xml version="1.0" encoding="utf-8"?>
 <p:sld xmlns:a="http://schemas.openxmlformats.org/drawingml/2006/main" xmlns:r="http://schemas.openxmlformats.org/officeDocument/2006/relationships" xmlns:mc="http://schemas.openxmlformats.org/markup-compatibility/2006" xmlns:mv="urn:schemas-microsoft-com:mac:vml" xmlns:p="http://schemas.openxmlformats.org/presentationml/2006/main" xmlns:c="http://schemas.openxmlformats.org/drawingml/2006/chart" xmlns:dgm="http://schemas.openxmlformats.org/drawingml/2006/diagram" xmlns:o="urn:schemas-microsoft-com:office:office" xmlns:v="urn:schemas-microsoft-com:vml" xmlns:pvml="urn:schemas-microsoft-com:office:powerpoint" xmlns:com="http://schemas.openxmlformats.org/drawingml/2006/compatibility" xmlns:p14="http://schemas.microsoft.com/office/powerpoint/2010/main" xmlns:p15="http://schemas.microsoft.com/office/powerpoint/2012/main">
   <p:cSld>
     <p:spTree>
       <p:nvGrpSpPr>
-        <p:cNvPr id="112" name="Shape 112"/>
+        <p:cNvPr id="117" name="Shape 117"/>
         <p:cNvGrpSpPr/>
         <p:nvPr/>
       </p:nvGrpSpPr>
@@ -22506,7 +23430,7 @@
       </p:grpSpPr>
       <p:sp>
         <p:nvSpPr>
-          <p:cNvPr id="113" name="Shape 113"/>
+          <p:cNvPr id="118" name="Shape 118"/>
           <p:cNvSpPr txBox="1"/>
           <p:nvPr>
             <p:ph type="title"/>
@@ -22538,7 +23462,7 @@
             </a:pPr>
             <a:r>
               <a:rPr lang="en-US"/>
-              <a:t>Second iteration</a:t>
+              <a:t>How to run your script</a:t>
             </a:r>
             <a:endParaRPr/>
           </a:p>
@@ -22546,7 +23470,7 @@
       </p:sp>
       <p:sp>
         <p:nvSpPr>
-          <p:cNvPr id="114" name="Shape 114"/>
+          <p:cNvPr id="119" name="Shape 119"/>
           <p:cNvSpPr txBox="1"/>
           <p:nvPr>
             <p:ph idx="1" type="body"/>
@@ -22568,9 +23492,6 @@
           <a:lstStyle/>
           <a:p>
             <a:pPr indent="-406400" lvl="0" marL="457200" rtl="0">
-              <a:lnSpc>
-                <a:spcPct val="150000"/>
-              </a:lnSpc>
               <a:spcBef>
                 <a:spcPts val="1000"/>
               </a:spcBef>
@@ -22582,15 +23503,16 @@
             </a:pPr>
             <a:r>
               <a:rPr lang="en-US"/>
-              <a:t>Let the user change the file name</a:t>
+              <a:t>Save your script as </a:t>
             </a:r>
-            <a:endParaRPr/>
+            <a:r>
+              <a:rPr i="1" lang="en-US"/>
+              <a:t>meme.sh</a:t>
+            </a:r>
+            <a:endParaRPr i="1"/>
           </a:p>
           <a:p>
             <a:pPr indent="-406400" lvl="0" marL="457200" rtl="0">
-              <a:lnSpc>
-                <a:spcPct val="150000"/>
-              </a:lnSpc>
               <a:spcBef>
                 <a:spcPts val="0"/>
               </a:spcBef>
@@ -22602,15 +23524,20 @@
             </a:pPr>
             <a:r>
               <a:rPr lang="en-US"/>
-              <a:t>Give a default file name if they don't provide one</a:t>
+              <a:t>On the command line </a:t>
             </a:r>
-            <a:endParaRPr/>
+            <a:r>
+              <a:rPr lang="en-US"/>
+              <a:t>run </a:t>
+            </a:r>
+            <a:r>
+              <a:rPr i="1" lang="en-US"/>
+              <a:t>chmod +x meme.sh</a:t>
+            </a:r>
+            <a:endParaRPr i="1"/>
           </a:p>
           <a:p>
             <a:pPr indent="-406400" lvl="0" marL="457200" rtl="0">
-              <a:lnSpc>
-                <a:spcPct val="150000"/>
-              </a:lnSpc>
               <a:spcBef>
                 <a:spcPts val="0"/>
               </a:spcBef>
@@ -22622,101 +23549,20 @@
             </a:pPr>
             <a:r>
               <a:rPr lang="en-US"/>
-              <a:t>Conditionals</a:t>
+              <a:t>Run </a:t>
             </a:r>
-            <a:endParaRPr/>
-          </a:p>
-          <a:p>
-            <a:pPr indent="0" lvl="0" marL="0" rtl="0">
-              <a:lnSpc>
-                <a:spcPct val="150000"/>
-              </a:lnSpc>
-              <a:spcBef>
-                <a:spcPts val="1000"/>
-              </a:spcBef>
-              <a:spcAft>
-                <a:spcPts val="0"/>
-              </a:spcAft>
-              <a:buNone/>
-            </a:pPr>
             <a:r>
-              <a:t/>
+              <a:rPr i="1" lang="en-US"/>
+              <a:t>./meme.sh</a:t>
             </a:r>
-            <a:endParaRPr/>
-          </a:p>
-          <a:p>
-            <a:pPr indent="0" lvl="0" marL="0" rtl="0">
-              <a:lnSpc>
-                <a:spcPct val="150000"/>
-              </a:lnSpc>
-              <a:spcBef>
-                <a:spcPts val="1000"/>
-              </a:spcBef>
-              <a:spcAft>
-                <a:spcPts val="0"/>
-              </a:spcAft>
-              <a:buNone/>
-            </a:pPr>
             <a:r>
-              <a:t/>
+              <a:rPr lang="en-US"/>
+              <a:t> on the command line.</a:t>
             </a:r>
             <a:endParaRPr/>
           </a:p>
         </p:txBody>
       </p:sp>
-    </p:spTree>
-  </p:cSld>
-  <p:clrMapOvr>
-    <a:masterClrMapping/>
-  </p:clrMapOvr>
-</p:sld>
-</file>
-
-<file path=ppt/slides/slide7.xml><?xml version="1.0" encoding="utf-8"?>
-<p:sld xmlns:a="http://schemas.openxmlformats.org/drawingml/2006/main" xmlns:r="http://schemas.openxmlformats.org/officeDocument/2006/relationships" xmlns:mc="http://schemas.openxmlformats.org/markup-compatibility/2006" xmlns:mv="urn:schemas-microsoft-com:mac:vml" xmlns:p="http://schemas.openxmlformats.org/presentationml/2006/main" xmlns:c="http://schemas.openxmlformats.org/drawingml/2006/chart" xmlns:dgm="http://schemas.openxmlformats.org/drawingml/2006/diagram" xmlns:o="urn:schemas-microsoft-com:office:office" xmlns:v="urn:schemas-microsoft-com:vml" xmlns:pvml="urn:schemas-microsoft-com:office:powerpoint" xmlns:com="http://schemas.openxmlformats.org/drawingml/2006/compatibility" xmlns:p14="http://schemas.microsoft.com/office/powerpoint/2010/main" xmlns:p15="http://schemas.microsoft.com/office/powerpoint/2012/main">
-  <p:cSld>
-    <p:spTree>
-      <p:nvGrpSpPr>
-        <p:cNvPr id="118" name="Shape 118"/>
-        <p:cNvGrpSpPr/>
-        <p:nvPr/>
-      </p:nvGrpSpPr>
-      <p:grpSpPr>
-        <a:xfrm>
-          <a:off x="0" y="0"/>
-          <a:ext cx="0" cy="0"/>
-          <a:chOff x="0" y="0"/>
-          <a:chExt cx="0" cy="0"/>
-        </a:xfrm>
-      </p:grpSpPr>
-      <p:pic>
-        <p:nvPicPr>
-          <p:cNvPr id="119" name="Shape 119"/>
-          <p:cNvPicPr preferRelativeResize="0"/>
-          <p:nvPr/>
-        </p:nvPicPr>
-        <p:blipFill>
-          <a:blip r:embed="rId3">
-            <a:alphaModFix/>
-          </a:blip>
-          <a:stretch>
-            <a:fillRect/>
-          </a:stretch>
-        </p:blipFill>
-        <p:spPr>
-          <a:xfrm>
-            <a:off x="1741424" y="1132838"/>
-            <a:ext cx="8709151" cy="4592324"/>
-          </a:xfrm>
-          <a:prstGeom prst="rect">
-            <a:avLst/>
-          </a:prstGeom>
-          <a:noFill/>
-          <a:ln>
-            <a:noFill/>
-          </a:ln>
-        </p:spPr>
-      </p:pic>
     </p:spTree>
   </p:cSld>
   <p:clrMapOvr>
@@ -22776,7 +23622,7 @@
             </a:pPr>
             <a:r>
               <a:rPr lang="en-US"/>
-              <a:t>Third iteration</a:t>
+              <a:t>Second iteration</a:t>
             </a:r>
             <a:endParaRPr/>
           </a:p>
@@ -22820,7 +23666,7 @@
             </a:pPr>
             <a:r>
               <a:rPr lang="en-US"/>
-              <a:t>Make the program "scriptable"</a:t>
+              <a:t>Let the user change the file name</a:t>
             </a:r>
             <a:endParaRPr/>
           </a:p>
@@ -22840,7 +23686,63 @@
             </a:pPr>
             <a:r>
               <a:rPr lang="en-US"/>
-              <a:t>But first we need a main function</a:t>
+              <a:t>Give a default file name if they don't provide one</a:t>
+            </a:r>
+            <a:endParaRPr/>
+          </a:p>
+          <a:p>
+            <a:pPr indent="-406400" lvl="0" marL="457200" rtl="0">
+              <a:lnSpc>
+                <a:spcPct val="150000"/>
+              </a:lnSpc>
+              <a:spcBef>
+                <a:spcPts val="0"/>
+              </a:spcBef>
+              <a:spcAft>
+                <a:spcPts val="0"/>
+              </a:spcAft>
+              <a:buSzPts val="2800"/>
+              <a:buChar char="•"/>
+            </a:pPr>
+            <a:r>
+              <a:rPr lang="en-US"/>
+              <a:t>Conditionals</a:t>
+            </a:r>
+            <a:endParaRPr/>
+          </a:p>
+          <a:p>
+            <a:pPr indent="0" lvl="0" marL="0" rtl="0">
+              <a:lnSpc>
+                <a:spcPct val="150000"/>
+              </a:lnSpc>
+              <a:spcBef>
+                <a:spcPts val="1000"/>
+              </a:spcBef>
+              <a:spcAft>
+                <a:spcPts val="0"/>
+              </a:spcAft>
+              <a:buNone/>
+            </a:pPr>
+            <a:r>
+              <a:t/>
+            </a:r>
+            <a:endParaRPr/>
+          </a:p>
+          <a:p>
+            <a:pPr indent="0" lvl="0" marL="0" rtl="0">
+              <a:lnSpc>
+                <a:spcPct val="150000"/>
+              </a:lnSpc>
+              <a:spcBef>
+                <a:spcPts val="1000"/>
+              </a:spcBef>
+              <a:spcAft>
+                <a:spcPts val="0"/>
+              </a:spcAft>
+              <a:buNone/>
+            </a:pPr>
+            <a:r>
+              <a:t/>
             </a:r>
             <a:endParaRPr/>
           </a:p>
@@ -22887,8 +23789,8 @@
         </p:blipFill>
         <p:spPr>
           <a:xfrm>
-            <a:off x="1705812" y="1053288"/>
-            <a:ext cx="8780376" cy="4751425"/>
+            <a:off x="1741424" y="1132838"/>
+            <a:ext cx="8709151" cy="4592324"/>
           </a:xfrm>
           <a:prstGeom prst="rect">
             <a:avLst/>
@@ -22908,6 +23810,285 @@
 </file>
 
 <file path=ppt/theme/theme1.xml><?xml version="1.0" encoding="utf-8"?>
+<a:theme xmlns:a="http://schemas.openxmlformats.org/drawingml/2006/main" xmlns:r="http://schemas.openxmlformats.org/officeDocument/2006/relationships" name="Office Theme">
+  <a:themeElements>
+    <a:clrScheme name="Office">
+      <a:dk1>
+        <a:srgbClr val="000000"/>
+      </a:dk1>
+      <a:lt1>
+        <a:srgbClr val="FFFFFF"/>
+      </a:lt1>
+      <a:dk2>
+        <a:srgbClr val="44546A"/>
+      </a:dk2>
+      <a:lt2>
+        <a:srgbClr val="E7E6E6"/>
+      </a:lt2>
+      <a:accent1>
+        <a:srgbClr val="5B9BD5"/>
+      </a:accent1>
+      <a:accent2>
+        <a:srgbClr val="ED7D31"/>
+      </a:accent2>
+      <a:accent3>
+        <a:srgbClr val="A5A5A5"/>
+      </a:accent3>
+      <a:accent4>
+        <a:srgbClr val="FFC000"/>
+      </a:accent4>
+      <a:accent5>
+        <a:srgbClr val="4472C4"/>
+      </a:accent5>
+      <a:accent6>
+        <a:srgbClr val="70AD47"/>
+      </a:accent6>
+      <a:hlink>
+        <a:srgbClr val="0563C1"/>
+      </a:hlink>
+      <a:folHlink>
+        <a:srgbClr val="954F72"/>
+      </a:folHlink>
+    </a:clrScheme>
+    <a:fontScheme name="Office">
+      <a:majorFont>
+        <a:latin typeface="Arial"/>
+        <a:ea typeface=""/>
+        <a:cs typeface=""/>
+        <a:font script="Jpan" typeface="ＭＳ Ｐゴシック"/>
+        <a:font script="Hang" typeface="맑은 고딕"/>
+        <a:font script="Hans" typeface="宋体"/>
+        <a:font script="Hant" typeface="新細明體"/>
+        <a:font script="Arab" typeface="Times New Roman"/>
+        <a:font script="Hebr" typeface="Times New Roman"/>
+        <a:font script="Thai" typeface="Angsana New"/>
+        <a:font script="Ethi" typeface="Nyala"/>
+        <a:font script="Beng" typeface="Vrinda"/>
+        <a:font script="Gujr" typeface="Shruti"/>
+        <a:font script="Khmr" typeface="MoolBoran"/>
+        <a:font script="Knda" typeface="Tunga"/>
+        <a:font script="Guru" typeface="Raavi"/>
+        <a:font script="Cans" typeface="Euphemia"/>
+        <a:font script="Cher" typeface="Plantagenet Cherokee"/>
+        <a:font script="Yiii" typeface="Microsoft Yi Baiti"/>
+        <a:font script="Tibt" typeface="Microsoft Himalaya"/>
+        <a:font script="Thaa" typeface="MV Boli"/>
+        <a:font script="Deva" typeface="Mangal"/>
+        <a:font script="Telu" typeface="Gautami"/>
+        <a:font script="Taml" typeface="Latha"/>
+        <a:font script="Syrc" typeface="Estrangelo Edessa"/>
+        <a:font script="Orya" typeface="Kalinga"/>
+        <a:font script="Mlym" typeface="Kartika"/>
+        <a:font script="Laoo" typeface="DokChampa"/>
+        <a:font script="Sinh" typeface="Iskoola Pota"/>
+        <a:font script="Mong" typeface="Mongolian Baiti"/>
+        <a:font script="Viet" typeface="Times New Roman"/>
+        <a:font script="Uigh" typeface="Microsoft Uighur"/>
+        <a:font script="Geor" typeface="Sylfaen"/>
+      </a:majorFont>
+      <a:minorFont>
+        <a:latin typeface="Arial"/>
+        <a:ea typeface=""/>
+        <a:cs typeface=""/>
+        <a:font script="Jpan" typeface="ＭＳ Ｐゴシック"/>
+        <a:font script="Hang" typeface="맑은 고딕"/>
+        <a:font script="Hans" typeface="宋体"/>
+        <a:font script="Hant" typeface="新細明體"/>
+        <a:font script="Arab" typeface="Arial"/>
+        <a:font script="Hebr" typeface="Arial"/>
+        <a:font script="Thai" typeface="Cordia New"/>
+        <a:font script="Ethi" typeface="Nyala"/>
+        <a:font script="Beng" typeface="Vrinda"/>
+        <a:font script="Gujr" typeface="Shruti"/>
+        <a:font script="Khmr" typeface="DaunPenh"/>
+        <a:font script="Knda" typeface="Tunga"/>
+        <a:font script="Guru" typeface="Raavi"/>
+        <a:font script="Cans" typeface="Euphemia"/>
+        <a:font script="Cher" typeface="Plantagenet Cherokee"/>
+        <a:font script="Yiii" typeface="Microsoft Yi Baiti"/>
+        <a:font script="Tibt" typeface="Microsoft Himalaya"/>
+        <a:font script="Thaa" typeface="MV Boli"/>
+        <a:font script="Deva" typeface="Mangal"/>
+        <a:font script="Telu" typeface="Gautami"/>
+        <a:font script="Taml" typeface="Latha"/>
+        <a:font script="Syrc" typeface="Estrangelo Edessa"/>
+        <a:font script="Orya" typeface="Kalinga"/>
+        <a:font script="Mlym" typeface="Kartika"/>
+        <a:font script="Laoo" typeface="DokChampa"/>
+        <a:font script="Sinh" typeface="Iskoola Pota"/>
+        <a:font script="Mong" typeface="Mongolian Baiti"/>
+        <a:font script="Viet" typeface="Arial"/>
+        <a:font script="Uigh" typeface="Microsoft Uighur"/>
+        <a:font script="Geor" typeface="Sylfaen"/>
+      </a:minorFont>
+    </a:fontScheme>
+    <a:fmtScheme name="Office">
+      <a:fillStyleLst>
+        <a:solidFill>
+          <a:schemeClr val="phClr"/>
+        </a:solidFill>
+        <a:gradFill rotWithShape="1">
+          <a:gsLst>
+            <a:gs pos="0">
+              <a:schemeClr val="phClr">
+                <a:tint val="50000"/>
+                <a:satMod val="300000"/>
+              </a:schemeClr>
+            </a:gs>
+            <a:gs pos="35000">
+              <a:schemeClr val="phClr">
+                <a:tint val="37000"/>
+                <a:satMod val="300000"/>
+              </a:schemeClr>
+            </a:gs>
+            <a:gs pos="100000">
+              <a:schemeClr val="phClr">
+                <a:tint val="15000"/>
+                <a:satMod val="350000"/>
+              </a:schemeClr>
+            </a:gs>
+          </a:gsLst>
+          <a:lin ang="16200000" scaled="1"/>
+        </a:gradFill>
+        <a:gradFill rotWithShape="1">
+          <a:gsLst>
+            <a:gs pos="0">
+              <a:schemeClr val="phClr">
+                <a:tint val="100000"/>
+                <a:shade val="100000"/>
+                <a:satMod val="130000"/>
+              </a:schemeClr>
+            </a:gs>
+            <a:gs pos="100000">
+              <a:schemeClr val="phClr">
+                <a:tint val="50000"/>
+                <a:shade val="100000"/>
+                <a:satMod val="350000"/>
+              </a:schemeClr>
+            </a:gs>
+          </a:gsLst>
+          <a:lin ang="16200000" scaled="0"/>
+        </a:gradFill>
+      </a:fillStyleLst>
+      <a:lnStyleLst>
+        <a:ln w="9525" cap="flat" cmpd="sng" algn="ctr">
+          <a:solidFill>
+            <a:schemeClr val="phClr">
+              <a:shade val="95000"/>
+              <a:satMod val="105000"/>
+            </a:schemeClr>
+          </a:solidFill>
+          <a:prstDash val="solid"/>
+        </a:ln>
+        <a:ln w="25400" cap="flat" cmpd="sng" algn="ctr">
+          <a:solidFill>
+            <a:schemeClr val="phClr"/>
+          </a:solidFill>
+          <a:prstDash val="solid"/>
+        </a:ln>
+        <a:ln w="38100" cap="flat" cmpd="sng" algn="ctr">
+          <a:solidFill>
+            <a:schemeClr val="phClr"/>
+          </a:solidFill>
+          <a:prstDash val="solid"/>
+        </a:ln>
+      </a:lnStyleLst>
+      <a:effectStyleLst>
+        <a:effectStyle>
+          <a:effectLst>
+            <a:outerShdw blurRad="40000" dist="20000" dir="5400000" rotWithShape="0">
+              <a:srgbClr val="000000">
+                <a:alpha val="38000"/>
+              </a:srgbClr>
+            </a:outerShdw>
+          </a:effectLst>
+        </a:effectStyle>
+        <a:effectStyle>
+          <a:effectLst>
+            <a:outerShdw blurRad="40000" dist="23000" dir="5400000" rotWithShape="0">
+              <a:srgbClr val="000000">
+                <a:alpha val="35000"/>
+              </a:srgbClr>
+            </a:outerShdw>
+          </a:effectLst>
+        </a:effectStyle>
+        <a:effectStyle>
+          <a:effectLst>
+            <a:outerShdw blurRad="40000" dist="23000" dir="5400000" rotWithShape="0">
+              <a:srgbClr val="000000">
+                <a:alpha val="35000"/>
+              </a:srgbClr>
+            </a:outerShdw>
+          </a:effectLst>
+          <a:scene3d>
+            <a:camera prst="orthographicFront">
+              <a:rot lat="0" lon="0" rev="0"/>
+            </a:camera>
+            <a:lightRig rig="threePt" dir="t">
+              <a:rot lat="0" lon="0" rev="1200000"/>
+            </a:lightRig>
+          </a:scene3d>
+          <a:sp3d>
+            <a:bevelT w="63500" h="25400"/>
+          </a:sp3d>
+        </a:effectStyle>
+      </a:effectStyleLst>
+      <a:bgFillStyleLst>
+        <a:solidFill>
+          <a:schemeClr val="phClr"/>
+        </a:solidFill>
+        <a:gradFill rotWithShape="1">
+          <a:gsLst>
+            <a:gs pos="0">
+              <a:schemeClr val="phClr">
+                <a:tint val="40000"/>
+                <a:satMod val="350000"/>
+              </a:schemeClr>
+            </a:gs>
+            <a:gs pos="40000">
+              <a:schemeClr val="phClr">
+                <a:tint val="45000"/>
+                <a:shade val="99000"/>
+                <a:satMod val="350000"/>
+              </a:schemeClr>
+            </a:gs>
+            <a:gs pos="100000">
+              <a:schemeClr val="phClr">
+                <a:shade val="20000"/>
+                <a:satMod val="255000"/>
+              </a:schemeClr>
+            </a:gs>
+          </a:gsLst>
+          <a:path path="circle">
+            <a:fillToRect l="50000" t="-80000" r="50000" b="180000"/>
+          </a:path>
+        </a:gradFill>
+        <a:gradFill rotWithShape="1">
+          <a:gsLst>
+            <a:gs pos="0">
+              <a:schemeClr val="phClr">
+                <a:tint val="80000"/>
+                <a:satMod val="300000"/>
+              </a:schemeClr>
+            </a:gs>
+            <a:gs pos="100000">
+              <a:schemeClr val="phClr">
+                <a:shade val="30000"/>
+                <a:satMod val="200000"/>
+              </a:schemeClr>
+            </a:gs>
+          </a:gsLst>
+          <a:path path="circle">
+            <a:fillToRect l="50000" t="50000" r="50000" b="50000"/>
+          </a:path>
+        </a:gradFill>
+      </a:bgFillStyleLst>
+    </a:fmtScheme>
+  </a:themeElements>
+</a:theme>
+</file>
+
+<file path=ppt/theme/theme2.xml><?xml version="1.0" encoding="utf-8"?>
 <a:theme xmlns:a="http://schemas.openxmlformats.org/drawingml/2006/main" xmlns:r="http://schemas.openxmlformats.org/officeDocument/2006/relationships" name="Custom Theme">
   <a:themeElements>
     <a:clrScheme name="Default">
@@ -23184,283 +24365,4 @@
     </a:fmtScheme>
   </a:themeElements>
 </a:theme>
-</file>
-
-<file path=ppt/theme/theme2.xml><?xml version="1.0" encoding="utf-8"?>
-<a:theme xmlns:a="http://schemas.openxmlformats.org/drawingml/2006/main" xmlns:r="http://schemas.openxmlformats.org/officeDocument/2006/relationships" name="Office Theme">
-  <a:themeElements>
-    <a:clrScheme name="Office">
-      <a:dk1>
-        <a:srgbClr val="000000"/>
-      </a:dk1>
-      <a:lt1>
-        <a:srgbClr val="FFFFFF"/>
-      </a:lt1>
-      <a:dk2>
-        <a:srgbClr val="44546A"/>
-      </a:dk2>
-      <a:lt2>
-        <a:srgbClr val="E7E6E6"/>
-      </a:lt2>
-      <a:accent1>
-        <a:srgbClr val="5B9BD5"/>
-      </a:accent1>
-      <a:accent2>
-        <a:srgbClr val="ED7D31"/>
-      </a:accent2>
-      <a:accent3>
-        <a:srgbClr val="A5A5A5"/>
-      </a:accent3>
-      <a:accent4>
-        <a:srgbClr val="FFC000"/>
-      </a:accent4>
-      <a:accent5>
-        <a:srgbClr val="4472C4"/>
-      </a:accent5>
-      <a:accent6>
-        <a:srgbClr val="70AD47"/>
-      </a:accent6>
-      <a:hlink>
-        <a:srgbClr val="0563C1"/>
-      </a:hlink>
-      <a:folHlink>
-        <a:srgbClr val="954F72"/>
-      </a:folHlink>
-    </a:clrScheme>
-    <a:fontScheme name="Office">
-      <a:majorFont>
-        <a:latin typeface="Arial"/>
-        <a:ea typeface=""/>
-        <a:cs typeface=""/>
-        <a:font script="Jpan" typeface="ＭＳ Ｐゴシック"/>
-        <a:font script="Hang" typeface="맑은 고딕"/>
-        <a:font script="Hans" typeface="宋体"/>
-        <a:font script="Hant" typeface="新細明體"/>
-        <a:font script="Arab" typeface="Times New Roman"/>
-        <a:font script="Hebr" typeface="Times New Roman"/>
-        <a:font script="Thai" typeface="Angsana New"/>
-        <a:font script="Ethi" typeface="Nyala"/>
-        <a:font script="Beng" typeface="Vrinda"/>
-        <a:font script="Gujr" typeface="Shruti"/>
-        <a:font script="Khmr" typeface="MoolBoran"/>
-        <a:font script="Knda" typeface="Tunga"/>
-        <a:font script="Guru" typeface="Raavi"/>
-        <a:font script="Cans" typeface="Euphemia"/>
-        <a:font script="Cher" typeface="Plantagenet Cherokee"/>
-        <a:font script="Yiii" typeface="Microsoft Yi Baiti"/>
-        <a:font script="Tibt" typeface="Microsoft Himalaya"/>
-        <a:font script="Thaa" typeface="MV Boli"/>
-        <a:font script="Deva" typeface="Mangal"/>
-        <a:font script="Telu" typeface="Gautami"/>
-        <a:font script="Taml" typeface="Latha"/>
-        <a:font script="Syrc" typeface="Estrangelo Edessa"/>
-        <a:font script="Orya" typeface="Kalinga"/>
-        <a:font script="Mlym" typeface="Kartika"/>
-        <a:font script="Laoo" typeface="DokChampa"/>
-        <a:font script="Sinh" typeface="Iskoola Pota"/>
-        <a:font script="Mong" typeface="Mongolian Baiti"/>
-        <a:font script="Viet" typeface="Times New Roman"/>
-        <a:font script="Uigh" typeface="Microsoft Uighur"/>
-        <a:font script="Geor" typeface="Sylfaen"/>
-      </a:majorFont>
-      <a:minorFont>
-        <a:latin typeface="Arial"/>
-        <a:ea typeface=""/>
-        <a:cs typeface=""/>
-        <a:font script="Jpan" typeface="ＭＳ Ｐゴシック"/>
-        <a:font script="Hang" typeface="맑은 고딕"/>
-        <a:font script="Hans" typeface="宋体"/>
-        <a:font script="Hant" typeface="新細明體"/>
-        <a:font script="Arab" typeface="Arial"/>
-        <a:font script="Hebr" typeface="Arial"/>
-        <a:font script="Thai" typeface="Cordia New"/>
-        <a:font script="Ethi" typeface="Nyala"/>
-        <a:font script="Beng" typeface="Vrinda"/>
-        <a:font script="Gujr" typeface="Shruti"/>
-        <a:font script="Khmr" typeface="DaunPenh"/>
-        <a:font script="Knda" typeface="Tunga"/>
-        <a:font script="Guru" typeface="Raavi"/>
-        <a:font script="Cans" typeface="Euphemia"/>
-        <a:font script="Cher" typeface="Plantagenet Cherokee"/>
-        <a:font script="Yiii" typeface="Microsoft Yi Baiti"/>
-        <a:font script="Tibt" typeface="Microsoft Himalaya"/>
-        <a:font script="Thaa" typeface="MV Boli"/>
-        <a:font script="Deva" typeface="Mangal"/>
-        <a:font script="Telu" typeface="Gautami"/>
-        <a:font script="Taml" typeface="Latha"/>
-        <a:font script="Syrc" typeface="Estrangelo Edessa"/>
-        <a:font script="Orya" typeface="Kalinga"/>
-        <a:font script="Mlym" typeface="Kartika"/>
-        <a:font script="Laoo" typeface="DokChampa"/>
-        <a:font script="Sinh" typeface="Iskoola Pota"/>
-        <a:font script="Mong" typeface="Mongolian Baiti"/>
-        <a:font script="Viet" typeface="Arial"/>
-        <a:font script="Uigh" typeface="Microsoft Uighur"/>
-        <a:font script="Geor" typeface="Sylfaen"/>
-      </a:minorFont>
-    </a:fontScheme>
-    <a:fmtScheme name="Office">
-      <a:fillStyleLst>
-        <a:solidFill>
-          <a:schemeClr val="phClr"/>
-        </a:solidFill>
-        <a:gradFill rotWithShape="1">
-          <a:gsLst>
-            <a:gs pos="0">
-              <a:schemeClr val="phClr">
-                <a:tint val="50000"/>
-                <a:satMod val="300000"/>
-              </a:schemeClr>
-            </a:gs>
-            <a:gs pos="35000">
-              <a:schemeClr val="phClr">
-                <a:tint val="37000"/>
-                <a:satMod val="300000"/>
-              </a:schemeClr>
-            </a:gs>
-            <a:gs pos="100000">
-              <a:schemeClr val="phClr">
-                <a:tint val="15000"/>
-                <a:satMod val="350000"/>
-              </a:schemeClr>
-            </a:gs>
-          </a:gsLst>
-          <a:lin ang="16200000" scaled="1"/>
-        </a:gradFill>
-        <a:gradFill rotWithShape="1">
-          <a:gsLst>
-            <a:gs pos="0">
-              <a:schemeClr val="phClr">
-                <a:tint val="100000"/>
-                <a:shade val="100000"/>
-                <a:satMod val="130000"/>
-              </a:schemeClr>
-            </a:gs>
-            <a:gs pos="100000">
-              <a:schemeClr val="phClr">
-                <a:tint val="50000"/>
-                <a:shade val="100000"/>
-                <a:satMod val="350000"/>
-              </a:schemeClr>
-            </a:gs>
-          </a:gsLst>
-          <a:lin ang="16200000" scaled="0"/>
-        </a:gradFill>
-      </a:fillStyleLst>
-      <a:lnStyleLst>
-        <a:ln w="9525" cap="flat" cmpd="sng" algn="ctr">
-          <a:solidFill>
-            <a:schemeClr val="phClr">
-              <a:shade val="95000"/>
-              <a:satMod val="105000"/>
-            </a:schemeClr>
-          </a:solidFill>
-          <a:prstDash val="solid"/>
-        </a:ln>
-        <a:ln w="25400" cap="flat" cmpd="sng" algn="ctr">
-          <a:solidFill>
-            <a:schemeClr val="phClr"/>
-          </a:solidFill>
-          <a:prstDash val="solid"/>
-        </a:ln>
-        <a:ln w="38100" cap="flat" cmpd="sng" algn="ctr">
-          <a:solidFill>
-            <a:schemeClr val="phClr"/>
-          </a:solidFill>
-          <a:prstDash val="solid"/>
-        </a:ln>
-      </a:lnStyleLst>
-      <a:effectStyleLst>
-        <a:effectStyle>
-          <a:effectLst>
-            <a:outerShdw blurRad="40000" dist="20000" dir="5400000" rotWithShape="0">
-              <a:srgbClr val="000000">
-                <a:alpha val="38000"/>
-              </a:srgbClr>
-            </a:outerShdw>
-          </a:effectLst>
-        </a:effectStyle>
-        <a:effectStyle>
-          <a:effectLst>
-            <a:outerShdw blurRad="40000" dist="23000" dir="5400000" rotWithShape="0">
-              <a:srgbClr val="000000">
-                <a:alpha val="35000"/>
-              </a:srgbClr>
-            </a:outerShdw>
-          </a:effectLst>
-        </a:effectStyle>
-        <a:effectStyle>
-          <a:effectLst>
-            <a:outerShdw blurRad="40000" dist="23000" dir="5400000" rotWithShape="0">
-              <a:srgbClr val="000000">
-                <a:alpha val="35000"/>
-              </a:srgbClr>
-            </a:outerShdw>
-          </a:effectLst>
-          <a:scene3d>
-            <a:camera prst="orthographicFront">
-              <a:rot lat="0" lon="0" rev="0"/>
-            </a:camera>
-            <a:lightRig rig="threePt" dir="t">
-              <a:rot lat="0" lon="0" rev="1200000"/>
-            </a:lightRig>
-          </a:scene3d>
-          <a:sp3d>
-            <a:bevelT w="63500" h="25400"/>
-          </a:sp3d>
-        </a:effectStyle>
-      </a:effectStyleLst>
-      <a:bgFillStyleLst>
-        <a:solidFill>
-          <a:schemeClr val="phClr"/>
-        </a:solidFill>
-        <a:gradFill rotWithShape="1">
-          <a:gsLst>
-            <a:gs pos="0">
-              <a:schemeClr val="phClr">
-                <a:tint val="40000"/>
-                <a:satMod val="350000"/>
-              </a:schemeClr>
-            </a:gs>
-            <a:gs pos="40000">
-              <a:schemeClr val="phClr">
-                <a:tint val="45000"/>
-                <a:shade val="99000"/>
-                <a:satMod val="350000"/>
-              </a:schemeClr>
-            </a:gs>
-            <a:gs pos="100000">
-              <a:schemeClr val="phClr">
-                <a:shade val="20000"/>
-                <a:satMod val="255000"/>
-              </a:schemeClr>
-            </a:gs>
-          </a:gsLst>
-          <a:path path="circle">
-            <a:fillToRect l="50000" t="-80000" r="50000" b="180000"/>
-          </a:path>
-        </a:gradFill>
-        <a:gradFill rotWithShape="1">
-          <a:gsLst>
-            <a:gs pos="0">
-              <a:schemeClr val="phClr">
-                <a:tint val="80000"/>
-                <a:satMod val="300000"/>
-              </a:schemeClr>
-            </a:gs>
-            <a:gs pos="100000">
-              <a:schemeClr val="phClr">
-                <a:shade val="30000"/>
-                <a:satMod val="200000"/>
-              </a:schemeClr>
-            </a:gs>
-          </a:gsLst>
-          <a:path path="circle">
-            <a:fillToRect l="50000" t="50000" r="50000" b="50000"/>
-          </a:path>
-        </a:gradFill>
-      </a:bgFillStyleLst>
-    </a:fmtScheme>
-  </a:themeElements>
-</a:theme>
 </file>
</xml_diff>